<commit_message>
Numerical Example Simulation Steps
Numerical Example
Simulation Steps
</commit_message>
<xml_diff>
--- a/Background and motivation.pptx
+++ b/Background and motivation.pptx
@@ -5,7 +5,7 @@
     <p:sldMasterId id="2147483720" r:id="rId1"/>
   </p:sldMasterIdLst>
   <p:notesMasterIdLst>
-    <p:notesMasterId r:id="rId29"/>
+    <p:notesMasterId r:id="rId52"/>
   </p:notesMasterIdLst>
   <p:sldIdLst>
     <p:sldId id="317" r:id="rId2"/>
@@ -28,13 +28,36 @@
     <p:sldId id="300" r:id="rId19"/>
     <p:sldId id="276" r:id="rId20"/>
     <p:sldId id="302" r:id="rId21"/>
-    <p:sldId id="309" r:id="rId22"/>
-    <p:sldId id="310" r:id="rId23"/>
-    <p:sldId id="311" r:id="rId24"/>
-    <p:sldId id="312" r:id="rId25"/>
-    <p:sldId id="313" r:id="rId26"/>
-    <p:sldId id="314" r:id="rId27"/>
-    <p:sldId id="315" r:id="rId28"/>
+    <p:sldId id="318" r:id="rId22"/>
+    <p:sldId id="309" r:id="rId23"/>
+    <p:sldId id="310" r:id="rId24"/>
+    <p:sldId id="311" r:id="rId25"/>
+    <p:sldId id="312" r:id="rId26"/>
+    <p:sldId id="313" r:id="rId27"/>
+    <p:sldId id="314" r:id="rId28"/>
+    <p:sldId id="315" r:id="rId29"/>
+    <p:sldId id="322" r:id="rId30"/>
+    <p:sldId id="319" r:id="rId31"/>
+    <p:sldId id="320" r:id="rId32"/>
+    <p:sldId id="321" r:id="rId33"/>
+    <p:sldId id="338" r:id="rId34"/>
+    <p:sldId id="337" r:id="rId35"/>
+    <p:sldId id="339" r:id="rId36"/>
+    <p:sldId id="324" r:id="rId37"/>
+    <p:sldId id="325" r:id="rId38"/>
+    <p:sldId id="326" r:id="rId39"/>
+    <p:sldId id="327" r:id="rId40"/>
+    <p:sldId id="328" r:id="rId41"/>
+    <p:sldId id="329" r:id="rId42"/>
+    <p:sldId id="330" r:id="rId43"/>
+    <p:sldId id="331" r:id="rId44"/>
+    <p:sldId id="332" r:id="rId45"/>
+    <p:sldId id="333" r:id="rId46"/>
+    <p:sldId id="334" r:id="rId47"/>
+    <p:sldId id="335" r:id="rId48"/>
+    <p:sldId id="336" r:id="rId49"/>
+    <p:sldId id="341" r:id="rId50"/>
+    <p:sldId id="340" r:id="rId51"/>
   </p:sldIdLst>
   <p:sldSz cx="12192000" cy="6858000"/>
   <p:notesSz cx="6858000" cy="9144000"/>
@@ -223,7 +246,7 @@
           <a:p>
             <a:fld id="{66EA208E-906A-4132-B1BA-0A73620AD9A5}" type="datetimeFigureOut">
               <a:rPr lang="en-US" smtClean="0"/>
-              <a:t>23-Nov-24</a:t>
+              <a:t>24-Nov-24</a:t>
             </a:fld>
             <a:endParaRPr lang="en-US"/>
           </a:p>
@@ -621,7 +644,7 @@
           <a:p>
             <a:fld id="{64F0E216-BA48-4F04-AC4F-645AA0DD6AC6}" type="datetimeFigureOut">
               <a:rPr lang="en-US" smtClean="0"/>
-              <a:t>23-Nov-24</a:t>
+              <a:t>24-Nov-24</a:t>
             </a:fld>
             <a:endParaRPr lang="en-US" dirty="0"/>
           </a:p>
@@ -791,7 +814,7 @@
           <a:p>
             <a:fld id="{64F0E216-BA48-4F04-AC4F-645AA0DD6AC6}" type="datetimeFigureOut">
               <a:rPr lang="en-US" smtClean="0"/>
-              <a:t>23-Nov-24</a:t>
+              <a:t>24-Nov-24</a:t>
             </a:fld>
             <a:endParaRPr lang="en-US"/>
           </a:p>
@@ -971,7 +994,7 @@
           <a:p>
             <a:fld id="{64F0E216-BA48-4F04-AC4F-645AA0DD6AC6}" type="datetimeFigureOut">
               <a:rPr lang="en-US" smtClean="0"/>
-              <a:t>23-Nov-24</a:t>
+              <a:t>24-Nov-24</a:t>
             </a:fld>
             <a:endParaRPr lang="en-US"/>
           </a:p>
@@ -1141,7 +1164,7 @@
           <a:p>
             <a:fld id="{64F0E216-BA48-4F04-AC4F-645AA0DD6AC6}" type="datetimeFigureOut">
               <a:rPr lang="en-US" smtClean="0"/>
-              <a:t>23-Nov-24</a:t>
+              <a:t>24-Nov-24</a:t>
             </a:fld>
             <a:endParaRPr lang="en-US"/>
           </a:p>
@@ -1387,7 +1410,7 @@
           <a:p>
             <a:fld id="{64F0E216-BA48-4F04-AC4F-645AA0DD6AC6}" type="datetimeFigureOut">
               <a:rPr lang="en-US" smtClean="0"/>
-              <a:t>23-Nov-24</a:t>
+              <a:t>24-Nov-24</a:t>
             </a:fld>
             <a:endParaRPr lang="en-US"/>
           </a:p>
@@ -1619,7 +1642,7 @@
           <a:p>
             <a:fld id="{64F0E216-BA48-4F04-AC4F-645AA0DD6AC6}" type="datetimeFigureOut">
               <a:rPr lang="en-US" smtClean="0"/>
-              <a:t>23-Nov-24</a:t>
+              <a:t>24-Nov-24</a:t>
             </a:fld>
             <a:endParaRPr lang="en-US"/>
           </a:p>
@@ -1986,7 +2009,7 @@
           <a:p>
             <a:fld id="{64F0E216-BA48-4F04-AC4F-645AA0DD6AC6}" type="datetimeFigureOut">
               <a:rPr lang="en-US" smtClean="0"/>
-              <a:t>23-Nov-24</a:t>
+              <a:t>24-Nov-24</a:t>
             </a:fld>
             <a:endParaRPr lang="en-US"/>
           </a:p>
@@ -2104,7 +2127,7 @@
           <a:p>
             <a:fld id="{64F0E216-BA48-4F04-AC4F-645AA0DD6AC6}" type="datetimeFigureOut">
               <a:rPr lang="en-US" smtClean="0"/>
-              <a:t>23-Nov-24</a:t>
+              <a:t>24-Nov-24</a:t>
             </a:fld>
             <a:endParaRPr lang="en-US"/>
           </a:p>
@@ -2199,7 +2222,7 @@
           <a:p>
             <a:fld id="{64F0E216-BA48-4F04-AC4F-645AA0DD6AC6}" type="datetimeFigureOut">
               <a:rPr lang="en-US" smtClean="0"/>
-              <a:t>23-Nov-24</a:t>
+              <a:t>24-Nov-24</a:t>
             </a:fld>
             <a:endParaRPr lang="en-US"/>
           </a:p>
@@ -2476,7 +2499,7 @@
           <a:p>
             <a:fld id="{64F0E216-BA48-4F04-AC4F-645AA0DD6AC6}" type="datetimeFigureOut">
               <a:rPr lang="en-US" smtClean="0"/>
-              <a:t>23-Nov-24</a:t>
+              <a:t>24-Nov-24</a:t>
             </a:fld>
             <a:endParaRPr lang="en-US"/>
           </a:p>
@@ -2733,7 +2756,7 @@
           <a:p>
             <a:fld id="{64F0E216-BA48-4F04-AC4F-645AA0DD6AC6}" type="datetimeFigureOut">
               <a:rPr lang="en-US" smtClean="0"/>
-              <a:t>23-Nov-24</a:t>
+              <a:t>24-Nov-24</a:t>
             </a:fld>
             <a:endParaRPr lang="en-US"/>
           </a:p>
@@ -2947,7 +2970,7 @@
             <a:fld id="{64F0E216-BA48-4F04-AC4F-645AA0DD6AC6}" type="datetimeFigureOut">
               <a:rPr lang="en-US" smtClean="0"/>
               <a:pPr/>
-              <a:t>23-Nov-24</a:t>
+              <a:t>24-Nov-24</a:t>
             </a:fld>
             <a:endParaRPr lang="en-US" dirty="0"/>
           </a:p>
@@ -4280,11 +4303,11 @@
         <p:spPr/>
         <p:txBody>
           <a:bodyPr>
-            <a:normAutofit fontScale="92500" lnSpcReduction="10000"/>
+            <a:normAutofit fontScale="92500" lnSpcReduction="20000"/>
           </a:bodyPr>
           <a:lstStyle/>
           <a:p>
-            <a:pPr marL="0" indent="0">
+            <a:pPr marL="0" indent="0" algn="just">
               <a:buNone/>
             </a:pPr>
             <a:r>
@@ -4292,7 +4315,7 @@
               <a:t>For instance, for this PhD project and during my preparation for this interview,  my Python expertise plays a key role in several areas (</a:t>
             </a:r>
             <a:r>
-              <a:rPr lang="en-US" sz="2800" b="1" dirty="0">
+              <a:rPr lang="en-US" sz="2800" dirty="0">
                 <a:latin typeface="Times New Roman" panose="02020603050405020304" pitchFamily="18" charset="0"/>
                 <a:cs typeface="Times New Roman" panose="02020603050405020304" pitchFamily="18" charset="0"/>
                 <a:hlinkClick r:id="rId2">
@@ -4306,21 +4329,32 @@
               <a:t>Visit our lab</a:t>
             </a:r>
             <a:r>
-              <a:rPr lang="en-US" sz="2800" b="1" dirty="0">
+              <a:rPr lang="en-US" sz="2800" dirty="0">
                 <a:latin typeface="Times New Roman" panose="02020603050405020304" pitchFamily="18" charset="0"/>
                 <a:cs typeface="Times New Roman" panose="02020603050405020304" pitchFamily="18" charset="0"/>
               </a:rPr>
               <a:t>) and (see the Appendix</a:t>
             </a:r>
             <a:r>
-              <a:rPr lang="en-US" b="1" dirty="0">
+              <a:rPr lang="en-US" dirty="0">
                 <a:latin typeface="Times New Roman" panose="02020603050405020304" pitchFamily="18" charset="0"/>
                 <a:cs typeface="Times New Roman" panose="02020603050405020304" pitchFamily="18" charset="0"/>
               </a:rPr>
-              <a:t>)</a:t>
-            </a:r>
-            <a:r>
-              <a:rPr lang="en-US" sz="2800" b="1" dirty="0">
+              <a:t>) for (</a:t>
+            </a:r>
+            <a:r>
+              <a:rPr lang="en-US" sz="2800" dirty="0">
+                <a:latin typeface="Times New Roman" panose="02020603050405020304" pitchFamily="18" charset="0"/>
+                <a:cs typeface="Times New Roman" panose="02020603050405020304" pitchFamily="18" charset="0"/>
+              </a:rPr>
+              <a:t>Random Fluctuations, Uptake Rate, Feedback Loop, Visualizing Trends) </a:t>
+            </a:r>
+            <a:r>
+              <a:rPr lang="en-US" dirty="0"/>
+              <a:t>of all stakeholder groups (patients, doctors, nurses, administrators)</a:t>
+            </a:r>
+            <a:r>
+              <a:rPr lang="en-US" sz="2800" dirty="0">
                 <a:latin typeface="Times New Roman" panose="02020603050405020304" pitchFamily="18" charset="0"/>
                 <a:cs typeface="Times New Roman" panose="02020603050405020304" pitchFamily="18" charset="0"/>
               </a:rPr>
@@ -5368,7 +5402,7 @@
           <p:cNvPr id="2" name="Title 1">
             <a:extLst>
               <a:ext uri="{FF2B5EF4-FFF2-40B4-BE49-F238E27FC236}">
-                <a16:creationId xmlns:a16="http://schemas.microsoft.com/office/drawing/2014/main" id="{C99277B6-5A7D-F80C-B993-E21EAE92B23F}"/>
+                <a16:creationId xmlns:a16="http://schemas.microsoft.com/office/drawing/2014/main" id="{23E7F1AE-18A6-61B9-12BD-59581FBF1F21}"/>
               </a:ext>
             </a:extLst>
           </p:cNvPr>
@@ -5381,66 +5415,90 @@
         </p:nvSpPr>
         <p:spPr/>
         <p:txBody>
-          <a:bodyPr>
-            <a:normAutofit/>
-          </a:bodyPr>
-          <a:lstStyle/>
-          <a:p>
+          <a:bodyPr/>
+          <a:lstStyle/>
+          <a:p>
+            <a:r>
+              <a:rPr lang="en-US" dirty="0"/>
+              <a:t>The engagement level is simulated for different groups</a:t>
+            </a:r>
+          </a:p>
+        </p:txBody>
+      </p:sp>
+      <p:sp>
+        <p:nvSpPr>
+          <p:cNvPr id="3" name="Content Placeholder 2">
+            <a:extLst>
+              <a:ext uri="{FF2B5EF4-FFF2-40B4-BE49-F238E27FC236}">
+                <a16:creationId xmlns:a16="http://schemas.microsoft.com/office/drawing/2014/main" id="{60F6674F-CA90-F119-4D66-CABE2D9136CA}"/>
+              </a:ext>
+            </a:extLst>
+          </p:cNvPr>
+          <p:cNvSpPr>
+            <a:spLocks noGrp="1"/>
+          </p:cNvSpPr>
+          <p:nvPr>
+            <p:ph idx="1"/>
+          </p:nvPr>
+        </p:nvSpPr>
+        <p:spPr/>
+        <p:txBody>
+          <a:bodyPr/>
+          <a:lstStyle/>
+          <a:p>
+            <a:pPr algn="just">
+              <a:buFont typeface="Arial" panose="020B0604020202020204" pitchFamily="34" charset="0"/>
+              <a:buChar char="•"/>
+            </a:pPr>
             <a:r>
               <a:rPr lang="en-US" b="1" dirty="0"/>
-              <a:t>A: Healthcare Participatory Model Simulation</a:t>
-            </a:r>
-          </a:p>
-        </p:txBody>
-      </p:sp>
-      <p:sp>
-        <p:nvSpPr>
-          <p:cNvPr id="3" name="Content Placeholder 2">
-            <a:extLst>
-              <a:ext uri="{FF2B5EF4-FFF2-40B4-BE49-F238E27FC236}">
-                <a16:creationId xmlns:a16="http://schemas.microsoft.com/office/drawing/2014/main" id="{23BE0B53-402D-8581-3510-C4B1E73C3D28}"/>
-              </a:ext>
-            </a:extLst>
-          </p:cNvPr>
-          <p:cNvSpPr>
-            <a:spLocks noGrp="1"/>
-          </p:cNvSpPr>
-          <p:nvPr>
-            <p:ph idx="1"/>
-          </p:nvPr>
-        </p:nvSpPr>
-        <p:spPr/>
-        <p:txBody>
-          <a:bodyPr>
-            <a:normAutofit fontScale="92500" lnSpcReduction="10000"/>
-          </a:bodyPr>
-          <a:lstStyle/>
-          <a:p>
-            <a:pPr algn="just"/>
-            <a:r>
-              <a:rPr lang="en-US" dirty="0"/>
-              <a:t>I have developed a Python-based code that simulates a simplified healthcare participatory model. This model collects, processes, and visualizes opinions from various healthcare stakeholders (patients, doctors, administrators). </a:t>
-            </a:r>
-          </a:p>
-          <a:p>
-            <a:pPr algn="just"/>
-            <a:r>
-              <a:rPr lang="en-US" dirty="0"/>
-              <a:t>The simulation demonstrates key processes such as data collection, stakeholder engagement, and system dynamics analysis—skills highly relevant to the Doctoral project. </a:t>
-            </a:r>
-          </a:p>
-          <a:p>
-            <a:pPr algn="just"/>
-            <a:r>
-              <a:rPr lang="en-US" dirty="0"/>
-              <a:t>The modular design of this code not only reflects my expertise in Python and data processing, but also demonstrates a deep understanding of participatory modeling, system dynamics, and stakeholder interactions within healthcare settings. </a:t>
-            </a:r>
-          </a:p>
-          <a:p>
-            <a:pPr algn="just"/>
-            <a:r>
-              <a:rPr lang="en-US" dirty="0"/>
-              <a:t>This code is adaptable, allowing for future refinement and expansion.</a:t>
+              <a:t>Patients</a:t>
+            </a:r>
+            <a:r>
+              <a:rPr lang="en-US" dirty="0"/>
+              <a:t>: How involved patients are in a healthcare system, project, or study.</a:t>
+            </a:r>
+          </a:p>
+          <a:p>
+            <a:pPr algn="just">
+              <a:buFont typeface="Arial" panose="020B0604020202020204" pitchFamily="34" charset="0"/>
+              <a:buChar char="•"/>
+            </a:pPr>
+            <a:r>
+              <a:rPr lang="en-US" b="1" dirty="0"/>
+              <a:t>Doctors</a:t>
+            </a:r>
+            <a:r>
+              <a:rPr lang="en-US" dirty="0"/>
+              <a:t>: The degree of participation or involvement of doctors in a healthcare setting or initiative.</a:t>
+            </a:r>
+          </a:p>
+          <a:p>
+            <a:pPr algn="just">
+              <a:buFont typeface="Arial" panose="020B0604020202020204" pitchFamily="34" charset="0"/>
+              <a:buChar char="•"/>
+            </a:pPr>
+            <a:r>
+              <a:rPr lang="en-US" b="1" dirty="0"/>
+              <a:t>Nurses</a:t>
+            </a:r>
+            <a:r>
+              <a:rPr lang="en-US" dirty="0"/>
+              <a:t>: The level of engagement of nursing staff in activities, events, or initiatives.</a:t>
+            </a:r>
+          </a:p>
+          <a:p>
+            <a:pPr algn="just">
+              <a:buFont typeface="Arial" panose="020B0604020202020204" pitchFamily="34" charset="0"/>
+              <a:buChar char="•"/>
+            </a:pPr>
+            <a:r>
+              <a:rPr lang="en-US" b="1" dirty="0"/>
+              <a:t>Administrators</a:t>
+            </a:r>
+            <a:r>
+              <a:rPr lang="en-US" dirty="0"/>
+              <a:t>: The level of involvement of administrative personnel in decision-making, planning, or day-to-day operations.</a:t>
             </a:r>
           </a:p>
         </p:txBody>
@@ -5448,7 +5506,7 @@
     </p:spTree>
     <p:extLst>
       <p:ext uri="{BB962C8B-B14F-4D97-AF65-F5344CB8AC3E}">
-        <p14:creationId xmlns:p14="http://schemas.microsoft.com/office/powerpoint/2010/main" val="2023197474"/>
+        <p14:creationId xmlns:p14="http://schemas.microsoft.com/office/powerpoint/2010/main" val="4227825685"/>
       </p:ext>
     </p:extLst>
   </p:cSld>
@@ -5480,7 +5538,7 @@
           <p:cNvPr id="2" name="Title 1">
             <a:extLst>
               <a:ext uri="{FF2B5EF4-FFF2-40B4-BE49-F238E27FC236}">
-                <a16:creationId xmlns:a16="http://schemas.microsoft.com/office/drawing/2014/main" id="{7A3A565F-926E-4737-D9C4-7136D0FDB6D3}"/>
+                <a16:creationId xmlns:a16="http://schemas.microsoft.com/office/drawing/2014/main" id="{C99277B6-5A7D-F80C-B993-E21EAE92B23F}"/>
               </a:ext>
             </a:extLst>
           </p:cNvPr>
@@ -5493,12 +5551,14 @@
         </p:nvSpPr>
         <p:spPr/>
         <p:txBody>
-          <a:bodyPr/>
+          <a:bodyPr>
+            <a:normAutofit/>
+          </a:bodyPr>
           <a:lstStyle/>
           <a:p>
             <a:r>
               <a:rPr lang="en-US" b="1" dirty="0"/>
-              <a:t>B: Statistical Distribution and Visualization</a:t>
+              <a:t>A: Healthcare Participatory Model Simulation</a:t>
             </a:r>
           </a:p>
         </p:txBody>
@@ -5508,7 +5568,7 @@
           <p:cNvPr id="3" name="Content Placeholder 2">
             <a:extLst>
               <a:ext uri="{FF2B5EF4-FFF2-40B4-BE49-F238E27FC236}">
-                <a16:creationId xmlns:a16="http://schemas.microsoft.com/office/drawing/2014/main" id="{8671093B-CE45-907C-0BD0-65B6A8BFFD5E}"/>
+                <a16:creationId xmlns:a16="http://schemas.microsoft.com/office/drawing/2014/main" id="{23BE0B53-402D-8581-3510-C4B1E73C3D28}"/>
               </a:ext>
             </a:extLst>
           </p:cNvPr>
@@ -5521,27 +5581,36 @@
         </p:nvSpPr>
         <p:spPr/>
         <p:txBody>
-          <a:bodyPr/>
+          <a:bodyPr>
+            <a:normAutofit fontScale="92500" lnSpcReduction="10000"/>
+          </a:bodyPr>
           <a:lstStyle/>
           <a:p>
             <a:pPr algn="just"/>
             <a:r>
               <a:rPr lang="en-US" dirty="0"/>
-              <a:t>I used Python to design a statistical distribution plot that visualizes simulated engagement levels of different healthcare stakeholders over a 12-month period. </a:t>
+              <a:t>I have developed a Python-based code that simulates a simplified healthcare participatory model. This model collects, processes, and visualizes opinions from various healthcare stakeholders (patients, doctors, administrators). </a:t>
             </a:r>
           </a:p>
           <a:p>
             <a:pPr algn="just"/>
             <a:r>
               <a:rPr lang="en-US" dirty="0"/>
-              <a:t>The histogram, with Kernel Density Estimate (KDE) lines, provides insights into the distribution and frequency of engagement within stakeholder groups (e.g., patients, doctors, nurses, administrators). </a:t>
+              <a:t>The simulation demonstrates key processes such as data collection, stakeholder engagement, and system dynamics analysis—skills highly relevant to the Doctoral project. </a:t>
             </a:r>
           </a:p>
           <a:p>
             <a:pPr algn="just"/>
             <a:r>
               <a:rPr lang="en-US" dirty="0"/>
-              <a:t>This visualization helps identify patterns—such as variations in engagement stability across different groups—and highlights areas where targeted strategies could improve participation.</a:t>
+              <a:t>The modular design of this code not only reflects my expertise in Python and data processing, but also demonstrates a deep understanding of participatory modeling, system dynamics, and stakeholder interactions within healthcare settings. </a:t>
+            </a:r>
+          </a:p>
+          <a:p>
+            <a:pPr algn="just"/>
+            <a:r>
+              <a:rPr lang="en-US" dirty="0"/>
+              <a:t>This code is adaptable, allowing for future refinement and expansion.</a:t>
             </a:r>
           </a:p>
         </p:txBody>
@@ -5549,7 +5618,7 @@
     </p:spTree>
     <p:extLst>
       <p:ext uri="{BB962C8B-B14F-4D97-AF65-F5344CB8AC3E}">
-        <p14:creationId xmlns:p14="http://schemas.microsoft.com/office/powerpoint/2010/main" val="1926944898"/>
+        <p14:creationId xmlns:p14="http://schemas.microsoft.com/office/powerpoint/2010/main" val="2023197474"/>
       </p:ext>
     </p:extLst>
   </p:cSld>
@@ -5581,7 +5650,7 @@
           <p:cNvPr id="2" name="Title 1">
             <a:extLst>
               <a:ext uri="{FF2B5EF4-FFF2-40B4-BE49-F238E27FC236}">
-                <a16:creationId xmlns:a16="http://schemas.microsoft.com/office/drawing/2014/main" id="{85333AAD-A473-D657-06A3-00351968AAAD}"/>
+                <a16:creationId xmlns:a16="http://schemas.microsoft.com/office/drawing/2014/main" id="{7A3A565F-926E-4737-D9C4-7136D0FDB6D3}"/>
               </a:ext>
             </a:extLst>
           </p:cNvPr>
@@ -5594,19 +5663,13 @@
         </p:nvSpPr>
         <p:spPr/>
         <p:txBody>
-          <a:bodyPr>
-            <a:normAutofit fontScale="90000"/>
-          </a:bodyPr>
+          <a:bodyPr/>
           <a:lstStyle/>
           <a:p>
             <a:r>
               <a:rPr lang="en-US" b="1" dirty="0"/>
-              <a:t>1. Random Fluctuations and Why They Are Used</a:t>
-            </a:r>
-            <a:br>
-              <a:rPr lang="en-US" b="1" dirty="0"/>
-            </a:br>
-            <a:endParaRPr lang="en-US" b="1" dirty="0"/>
+              <a:t>B: Statistical Distribution and Visualization</a:t>
+            </a:r>
           </a:p>
         </p:txBody>
       </p:sp>
@@ -5615,7 +5678,7 @@
           <p:cNvPr id="3" name="Content Placeholder 2">
             <a:extLst>
               <a:ext uri="{FF2B5EF4-FFF2-40B4-BE49-F238E27FC236}">
-                <a16:creationId xmlns:a16="http://schemas.microsoft.com/office/drawing/2014/main" id="{EB8460CD-91E9-1156-5004-378946AD5F9A}"/>
+                <a16:creationId xmlns:a16="http://schemas.microsoft.com/office/drawing/2014/main" id="{8671093B-CE45-907C-0BD0-65B6A8BFFD5E}"/>
               </a:ext>
             </a:extLst>
           </p:cNvPr>
@@ -5628,90 +5691,35 @@
         </p:nvSpPr>
         <p:spPr/>
         <p:txBody>
-          <a:bodyPr>
-            <a:normAutofit fontScale="92500" lnSpcReduction="20000"/>
-          </a:bodyPr>
-          <a:lstStyle/>
-          <a:p>
-            <a:pPr>
-              <a:buFont typeface="Arial" panose="020B0604020202020204" pitchFamily="34" charset="0"/>
-              <a:buChar char="•"/>
-            </a:pPr>
-            <a:r>
-              <a:rPr lang="en-US" b="1" dirty="0"/>
-              <a:t>Reason</a:t>
-            </a:r>
-            <a:r>
-              <a:rPr lang="en-US" dirty="0"/>
-              <a:t>: Engagement levels in real-world systems (e.g., healthcare participation) are inherently unpredictable and influenced by numerous factors such as personal behavior, external policies, or environmental changes.</a:t>
-            </a:r>
-          </a:p>
-          <a:p>
-            <a:pPr>
-              <a:buFont typeface="Arial" panose="020B0604020202020204" pitchFamily="34" charset="0"/>
-              <a:buChar char="•"/>
-            </a:pPr>
-            <a:r>
-              <a:rPr lang="en-US" b="1" dirty="0"/>
-              <a:t>Purpose in the Simulation</a:t>
-            </a:r>
-            <a:r>
-              <a:rPr lang="en-US" dirty="0"/>
-              <a:t>:</a:t>
-            </a:r>
-          </a:p>
-          <a:p>
-            <a:pPr marL="742950" lvl="1" indent="-285750">
-              <a:buFont typeface="Arial" panose="020B0604020202020204" pitchFamily="34" charset="0"/>
-              <a:buChar char="•"/>
-            </a:pPr>
-            <a:r>
-              <a:rPr lang="en-US" dirty="0"/>
-              <a:t>They introduce variability, making the model more realistic by simulating both increases and decreases in engagement levels over time.</a:t>
-            </a:r>
-          </a:p>
-          <a:p>
-            <a:pPr marL="742950" lvl="1" indent="-285750">
-              <a:buFont typeface="Arial" panose="020B0604020202020204" pitchFamily="34" charset="0"/>
-              <a:buChar char="•"/>
-            </a:pPr>
-            <a:r>
-              <a:rPr lang="en-US" dirty="0"/>
-              <a:t>Random fluctuations also allow the model to reflect potential short-term disruptions (e.g., staff shortages, new initiatives).</a:t>
-            </a:r>
-          </a:p>
-          <a:p>
-            <a:pPr>
-              <a:buFont typeface="Arial" panose="020B0604020202020204" pitchFamily="34" charset="0"/>
-              <a:buChar char="•"/>
-            </a:pPr>
-            <a:r>
-              <a:rPr lang="en-US" b="1" dirty="0"/>
-              <a:t>Example</a:t>
-            </a:r>
-            <a:r>
-              <a:rPr lang="en-US" dirty="0"/>
-              <a:t>: If "Patients" engagement starts at 0.6 and fluctuates randomly within [−0.02,+0.02][-0.02, +0.02][−0.02,+0.02], the variability mimics real-world behaviors such as patients being more engaged during health campaigns and less engaged during holidays.</a:t>
-            </a:r>
-          </a:p>
-          <a:p>
-            <a:pPr marL="0" indent="0">
-              <a:buNone/>
-            </a:pPr>
-            <a:endParaRPr lang="en-US" dirty="0"/>
-          </a:p>
-          <a:p>
-            <a:pPr marL="0" indent="0">
-              <a:buNone/>
-            </a:pPr>
-            <a:endParaRPr lang="en-US" dirty="0"/>
+          <a:bodyPr/>
+          <a:lstStyle/>
+          <a:p>
+            <a:pPr algn="just"/>
+            <a:r>
+              <a:rPr lang="en-US" dirty="0"/>
+              <a:t>I used Python to design a statistical distribution plot that visualizes simulated engagement levels of different healthcare stakeholders over a 12-month period. </a:t>
+            </a:r>
+          </a:p>
+          <a:p>
+            <a:pPr algn="just"/>
+            <a:r>
+              <a:rPr lang="en-US" dirty="0"/>
+              <a:t>The histogram, with Kernel Density Estimate (KDE) lines, provides insights into the distribution and frequency of engagement within stakeholder groups (e.g., patients, doctors, nurses, administrators). </a:t>
+            </a:r>
+          </a:p>
+          <a:p>
+            <a:pPr algn="just"/>
+            <a:r>
+              <a:rPr lang="en-US" dirty="0"/>
+              <a:t>This visualization helps identify patterns—such as variations in engagement stability across different groups—and highlights areas where targeted strategies could improve participation.</a:t>
+            </a:r>
           </a:p>
         </p:txBody>
       </p:sp>
     </p:spTree>
     <p:extLst>
       <p:ext uri="{BB962C8B-B14F-4D97-AF65-F5344CB8AC3E}">
-        <p14:creationId xmlns:p14="http://schemas.microsoft.com/office/powerpoint/2010/main" val="2079446477"/>
+        <p14:creationId xmlns:p14="http://schemas.microsoft.com/office/powerpoint/2010/main" val="1926944898"/>
       </p:ext>
     </p:extLst>
   </p:cSld>
@@ -5743,7 +5751,7 @@
           <p:cNvPr id="2" name="Title 1">
             <a:extLst>
               <a:ext uri="{FF2B5EF4-FFF2-40B4-BE49-F238E27FC236}">
-                <a16:creationId xmlns:a16="http://schemas.microsoft.com/office/drawing/2014/main" id="{FA4AF6BA-5094-CAD8-1EFA-108DF856B922}"/>
+                <a16:creationId xmlns:a16="http://schemas.microsoft.com/office/drawing/2014/main" id="{85333AAD-A473-D657-06A3-00351968AAAD}"/>
               </a:ext>
             </a:extLst>
           </p:cNvPr>
@@ -5756,13 +5764,19 @@
         </p:nvSpPr>
         <p:spPr/>
         <p:txBody>
-          <a:bodyPr/>
+          <a:bodyPr>
+            <a:normAutofit fontScale="90000"/>
+          </a:bodyPr>
           <a:lstStyle/>
           <a:p>
             <a:r>
               <a:rPr lang="en-US" b="1" dirty="0"/>
-              <a:t>2. Uptake Rate and Why It Is Used</a:t>
-            </a:r>
+              <a:t>1. Random Fluctuations and Why They Are Used</a:t>
+            </a:r>
+            <a:br>
+              <a:rPr lang="en-US" b="1" dirty="0"/>
+            </a:br>
+            <a:endParaRPr lang="en-US" b="1" dirty="0"/>
           </a:p>
         </p:txBody>
       </p:sp>
@@ -5771,7 +5785,7 @@
           <p:cNvPr id="3" name="Content Placeholder 2">
             <a:extLst>
               <a:ext uri="{FF2B5EF4-FFF2-40B4-BE49-F238E27FC236}">
-                <a16:creationId xmlns:a16="http://schemas.microsoft.com/office/drawing/2014/main" id="{4D502198-8EB0-56EA-0ECB-09A57E30C318}"/>
+                <a16:creationId xmlns:a16="http://schemas.microsoft.com/office/drawing/2014/main" id="{EB8460CD-91E9-1156-5004-378946AD5F9A}"/>
               </a:ext>
             </a:extLst>
           </p:cNvPr>
@@ -5785,7 +5799,7 @@
         <p:spPr/>
         <p:txBody>
           <a:bodyPr>
-            <a:normAutofit fontScale="92500" lnSpcReduction="10000"/>
+            <a:normAutofit fontScale="92500" lnSpcReduction="20000"/>
           </a:bodyPr>
           <a:lstStyle/>
           <a:p>
@@ -5799,7 +5813,7 @@
             </a:r>
             <a:r>
               <a:rPr lang="en-US" dirty="0"/>
-              <a:t>: The uptake rate summarizes the system's overall engagement by averaging the contributions of all stakeholder groups (patients, doctors, nurses, administrators).</a:t>
+              <a:t>: Engagement levels in real-world systems (e.g., healthcare participation) are inherently unpredictable and influenced by numerous factors such as personal behavior, external policies, or environmental changes.</a:t>
             </a:r>
           </a:p>
           <a:p>
@@ -5823,7 +5837,7 @@
             </a:pPr>
             <a:r>
               <a:rPr lang="en-US" dirty="0"/>
-              <a:t>It provides a high-level metric to evaluate the program's success.</a:t>
+              <a:t>They introduce variability, making the model more realistic by simulating both increases and decreases in engagement levels over time.</a:t>
             </a:r>
           </a:p>
           <a:p>
@@ -5833,17 +5847,7 @@
             </a:pPr>
             <a:r>
               <a:rPr lang="en-US" dirty="0"/>
-              <a:t>By tracking uptake over time, it identifies patterns and trends that can inform decision-making (e.g., whether engagement is improving or declining).</a:t>
-            </a:r>
-          </a:p>
-          <a:p>
-            <a:pPr marL="742950" lvl="1" indent="-285750">
-              <a:buFont typeface="Arial" panose="020B0604020202020204" pitchFamily="34" charset="0"/>
-              <a:buChar char="•"/>
-            </a:pPr>
-            <a:r>
-              <a:rPr lang="en-US" dirty="0"/>
-              <a:t>Aggregating individual engagement levels into a single uptake rate is useful for comparing across time or scenarios.</a:t>
+              <a:t>Random fluctuations also allow the model to reflect potential short-term disruptions (e.g., staff shortages, new initiatives).</a:t>
             </a:r>
           </a:p>
           <a:p>
@@ -5857,7 +5861,7 @@
             </a:r>
             <a:r>
               <a:rPr lang="en-US" dirty="0"/>
-              <a:t>: If engagement for doctors is high but low for administrators, the uptake rate highlights this gap. Monitoring it monthly ensures timely adjustments.</a:t>
+              <a:t>: If "Patients" engagement starts at 0.6 and fluctuates randomly within [−0.02,+0.02][-0.02, +0.02][−0.02,+0.02], the variability mimics real-world behaviors such as patients being more engaged during health campaigns and less engaged during holidays.</a:t>
             </a:r>
           </a:p>
           <a:p>
@@ -5877,7 +5881,7 @@
     </p:spTree>
     <p:extLst>
       <p:ext uri="{BB962C8B-B14F-4D97-AF65-F5344CB8AC3E}">
-        <p14:creationId xmlns:p14="http://schemas.microsoft.com/office/powerpoint/2010/main" val="1197161432"/>
+        <p14:creationId xmlns:p14="http://schemas.microsoft.com/office/powerpoint/2010/main" val="2079446477"/>
       </p:ext>
     </p:extLst>
   </p:cSld>
@@ -5909,7 +5913,7 @@
           <p:cNvPr id="2" name="Title 1">
             <a:extLst>
               <a:ext uri="{FF2B5EF4-FFF2-40B4-BE49-F238E27FC236}">
-                <a16:creationId xmlns:a16="http://schemas.microsoft.com/office/drawing/2014/main" id="{22045202-0EBC-98EB-84A8-D77B0D7E4ACF}"/>
+                <a16:creationId xmlns:a16="http://schemas.microsoft.com/office/drawing/2014/main" id="{FA4AF6BA-5094-CAD8-1EFA-108DF856B922}"/>
               </a:ext>
             </a:extLst>
           </p:cNvPr>
@@ -5926,10 +5930,9 @@
           <a:lstStyle/>
           <a:p>
             <a:r>
-              <a:rPr lang="en-US" sz="4400" b="1" dirty="0"/>
-              <a:t>3. Feedback Loop and Why It Is Used</a:t>
-            </a:r>
-            <a:endParaRPr lang="en-US" dirty="0"/>
+              <a:rPr lang="en-US" b="1" dirty="0"/>
+              <a:t>2. Uptake Rate and Why It Is Used</a:t>
+            </a:r>
           </a:p>
         </p:txBody>
       </p:sp>
@@ -5938,7 +5941,7 @@
           <p:cNvPr id="3" name="Content Placeholder 2">
             <a:extLst>
               <a:ext uri="{FF2B5EF4-FFF2-40B4-BE49-F238E27FC236}">
-                <a16:creationId xmlns:a16="http://schemas.microsoft.com/office/drawing/2014/main" id="{AFC0FC29-9C04-1D18-55DA-05D85BA03178}"/>
+                <a16:creationId xmlns:a16="http://schemas.microsoft.com/office/drawing/2014/main" id="{4D502198-8EB0-56EA-0ECB-09A57E30C318}"/>
               </a:ext>
             </a:extLst>
           </p:cNvPr>
@@ -5952,7 +5955,7 @@
         <p:spPr/>
         <p:txBody>
           <a:bodyPr>
-            <a:normAutofit fontScale="85000" lnSpcReduction="20000"/>
+            <a:normAutofit fontScale="92500" lnSpcReduction="10000"/>
           </a:bodyPr>
           <a:lstStyle/>
           <a:p>
@@ -5966,7 +5969,21 @@
             </a:r>
             <a:r>
               <a:rPr lang="en-US" dirty="0"/>
-              <a:t>: Engagement in one period influences future participation, as people’s behavior often follows momentum (positive or negative). For instance:</a:t>
+              <a:t>: The uptake rate summarizes the system's overall engagement by averaging the contributions of all stakeholder groups (patients, doctors, nurses, administrators).</a:t>
+            </a:r>
+          </a:p>
+          <a:p>
+            <a:pPr>
+              <a:buFont typeface="Arial" panose="020B0604020202020204" pitchFamily="34" charset="0"/>
+              <a:buChar char="•"/>
+            </a:pPr>
+            <a:r>
+              <a:rPr lang="en-US" b="1" dirty="0"/>
+              <a:t>Purpose in the Simulation</a:t>
+            </a:r>
+            <a:r>
+              <a:rPr lang="en-US" dirty="0"/>
+              <a:t>:</a:t>
             </a:r>
           </a:p>
           <a:p>
@@ -5976,7 +5993,7 @@
             </a:pPr>
             <a:r>
               <a:rPr lang="en-US" dirty="0"/>
-              <a:t>A stakeholder's higher engagement in one month could lead to better results or satisfaction, encouraging continued involvement.</a:t>
+              <a:t>It provides a high-level metric to evaluate the program's success.</a:t>
             </a:r>
           </a:p>
           <a:p>
@@ -5986,7 +6003,17 @@
             </a:pPr>
             <a:r>
               <a:rPr lang="en-US" dirty="0"/>
-              <a:t>Conversely, disengagement could compound due to frustration, leading to further drops.</a:t>
+              <a:t>By tracking uptake over time, it identifies patterns and trends that can inform decision-making (e.g., whether engagement is improving or declining).</a:t>
+            </a:r>
+          </a:p>
+          <a:p>
+            <a:pPr marL="742950" lvl="1" indent="-285750">
+              <a:buFont typeface="Arial" panose="020B0604020202020204" pitchFamily="34" charset="0"/>
+              <a:buChar char="•"/>
+            </a:pPr>
+            <a:r>
+              <a:rPr lang="en-US" dirty="0"/>
+              <a:t>Aggregating individual engagement levels into a single uptake rate is useful for comparing across time or scenarios.</a:t>
             </a:r>
           </a:p>
           <a:p>
@@ -5996,53 +6023,31 @@
             </a:pPr>
             <a:r>
               <a:rPr lang="en-US" b="1" dirty="0"/>
-              <a:t>Purpose in the Simulation</a:t>
-            </a:r>
-            <a:r>
-              <a:rPr lang="en-US" dirty="0"/>
-              <a:t>:</a:t>
-            </a:r>
-          </a:p>
-          <a:p>
-            <a:pPr marL="742950" lvl="1" indent="-285750">
-              <a:buFont typeface="Arial" panose="020B0604020202020204" pitchFamily="34" charset="0"/>
-              <a:buChar char="•"/>
-            </a:pPr>
-            <a:r>
-              <a:rPr lang="en-US" dirty="0"/>
-              <a:t>The feedback loop captures these cascading effects, helping simulate long-term dynamics.</a:t>
-            </a:r>
-          </a:p>
-          <a:p>
-            <a:pPr marL="742950" lvl="1" indent="-285750">
-              <a:buFont typeface="Arial" panose="020B0604020202020204" pitchFamily="34" charset="0"/>
-              <a:buChar char="•"/>
-            </a:pPr>
-            <a:r>
-              <a:rPr lang="en-US" dirty="0"/>
-              <a:t>It reflects realistic cause-and-effect relationships, showing how policies or external shocks affect sustained participation.</a:t>
-            </a:r>
-          </a:p>
-          <a:p>
-            <a:pPr>
-              <a:buFont typeface="Arial" panose="020B0604020202020204" pitchFamily="34" charset="0"/>
-              <a:buChar char="•"/>
-            </a:pPr>
-            <a:r>
-              <a:rPr lang="en-US" b="1" dirty="0"/>
               <a:t>Example</a:t>
             </a:r>
             <a:r>
               <a:rPr lang="en-US" dirty="0"/>
-              <a:t>: If "Doctors" engagement decreases slightly in Month 2, the new lower level sets the baseline for Month 3, leading to a compounding effect unless counteracted by positive fluctuations.</a:t>
-            </a:r>
+              <a:t>: If engagement for doctors is high but low for administrators, the uptake rate highlights this gap. Monitoring it monthly ensures timely adjustments.</a:t>
+            </a:r>
+          </a:p>
+          <a:p>
+            <a:pPr marL="0" indent="0">
+              <a:buNone/>
+            </a:pPr>
+            <a:endParaRPr lang="en-US" dirty="0"/>
+          </a:p>
+          <a:p>
+            <a:pPr marL="0" indent="0">
+              <a:buNone/>
+            </a:pPr>
+            <a:endParaRPr lang="en-US" dirty="0"/>
           </a:p>
         </p:txBody>
       </p:sp>
     </p:spTree>
     <p:extLst>
       <p:ext uri="{BB962C8B-B14F-4D97-AF65-F5344CB8AC3E}">
-        <p14:creationId xmlns:p14="http://schemas.microsoft.com/office/powerpoint/2010/main" val="1348638516"/>
+        <p14:creationId xmlns:p14="http://schemas.microsoft.com/office/powerpoint/2010/main" val="1197161432"/>
       </p:ext>
     </p:extLst>
   </p:cSld>
@@ -6074,7 +6079,7 @@
           <p:cNvPr id="2" name="Title 1">
             <a:extLst>
               <a:ext uri="{FF2B5EF4-FFF2-40B4-BE49-F238E27FC236}">
-                <a16:creationId xmlns:a16="http://schemas.microsoft.com/office/drawing/2014/main" id="{865F4C6E-9293-6315-8011-08E6FA8D4403}"/>
+                <a16:creationId xmlns:a16="http://schemas.microsoft.com/office/drawing/2014/main" id="{22045202-0EBC-98EB-84A8-D77B0D7E4ACF}"/>
               </a:ext>
             </a:extLst>
           </p:cNvPr>
@@ -6087,42 +6092,37 @@
         </p:nvSpPr>
         <p:spPr/>
         <p:txBody>
+          <a:bodyPr/>
+          <a:lstStyle/>
+          <a:p>
+            <a:r>
+              <a:rPr lang="en-US" sz="4400" b="1" dirty="0"/>
+              <a:t>3. Feedback Loop and Why It Is Used</a:t>
+            </a:r>
+            <a:endParaRPr lang="en-US" dirty="0"/>
+          </a:p>
+        </p:txBody>
+      </p:sp>
+      <p:sp>
+        <p:nvSpPr>
+          <p:cNvPr id="3" name="Content Placeholder 2">
+            <a:extLst>
+              <a:ext uri="{FF2B5EF4-FFF2-40B4-BE49-F238E27FC236}">
+                <a16:creationId xmlns:a16="http://schemas.microsoft.com/office/drawing/2014/main" id="{AFC0FC29-9C04-1D18-55DA-05D85BA03178}"/>
+              </a:ext>
+            </a:extLst>
+          </p:cNvPr>
+          <p:cNvSpPr>
+            <a:spLocks noGrp="1"/>
+          </p:cNvSpPr>
+          <p:nvPr>
+            <p:ph idx="1"/>
+          </p:nvPr>
+        </p:nvSpPr>
+        <p:spPr/>
+        <p:txBody>
           <a:bodyPr>
-            <a:normAutofit fontScale="90000"/>
-          </a:bodyPr>
-          <a:lstStyle/>
-          <a:p>
-            <a:r>
-              <a:rPr lang="en-US" sz="4400" b="1" dirty="0"/>
-              <a:t>4. Visualizing Trends and Why It Is Important</a:t>
-            </a:r>
-            <a:br>
-              <a:rPr lang="en-US" sz="4400" b="1" dirty="0"/>
-            </a:br>
-            <a:endParaRPr lang="en-US" dirty="0"/>
-          </a:p>
-        </p:txBody>
-      </p:sp>
-      <p:sp>
-        <p:nvSpPr>
-          <p:cNvPr id="3" name="Content Placeholder 2">
-            <a:extLst>
-              <a:ext uri="{FF2B5EF4-FFF2-40B4-BE49-F238E27FC236}">
-                <a16:creationId xmlns:a16="http://schemas.microsoft.com/office/drawing/2014/main" id="{FB0D8D01-EDAF-C0DE-17BF-73983E6CC4D1}"/>
-              </a:ext>
-            </a:extLst>
-          </p:cNvPr>
-          <p:cNvSpPr>
-            <a:spLocks noGrp="1"/>
-          </p:cNvSpPr>
-          <p:nvPr>
-            <p:ph idx="1"/>
-          </p:nvPr>
-        </p:nvSpPr>
-        <p:spPr/>
-        <p:txBody>
-          <a:bodyPr>
-            <a:normAutofit/>
+            <a:normAutofit fontScale="85000" lnSpcReduction="20000"/>
           </a:bodyPr>
           <a:lstStyle/>
           <a:p>
@@ -6136,7 +6136,27 @@
             </a:r>
             <a:r>
               <a:rPr lang="en-US" dirty="0"/>
-              <a:t>: Trends over time help stakeholders understand the overall direction of the system and pinpoint areas for intervention.</a:t>
+              <a:t>: Engagement in one period influences future participation, as people’s behavior often follows momentum (positive or negative). For instance:</a:t>
+            </a:r>
+          </a:p>
+          <a:p>
+            <a:pPr marL="742950" lvl="1" indent="-285750">
+              <a:buFont typeface="Arial" panose="020B0604020202020204" pitchFamily="34" charset="0"/>
+              <a:buChar char="•"/>
+            </a:pPr>
+            <a:r>
+              <a:rPr lang="en-US" dirty="0"/>
+              <a:t>A stakeholder's higher engagement in one month could lead to better results or satisfaction, encouraging continued involvement.</a:t>
+            </a:r>
+          </a:p>
+          <a:p>
+            <a:pPr marL="742950" lvl="1" indent="-285750">
+              <a:buFont typeface="Arial" panose="020B0604020202020204" pitchFamily="34" charset="0"/>
+              <a:buChar char="•"/>
+            </a:pPr>
+            <a:r>
+              <a:rPr lang="en-US" dirty="0"/>
+              <a:t>Conversely, disengagement could compound due to frustration, leading to further drops.</a:t>
             </a:r>
           </a:p>
           <a:p>
@@ -6160,7 +6180,7 @@
             </a:pPr>
             <a:r>
               <a:rPr lang="en-US" dirty="0"/>
-              <a:t>Identifying whether engagement levels are increasing, stable, or declining over time helps evaluate program success.</a:t>
+              <a:t>The feedback loop captures these cascading effects, helping simulate long-term dynamics.</a:t>
             </a:r>
           </a:p>
           <a:p>
@@ -6170,7 +6190,7 @@
             </a:pPr>
             <a:r>
               <a:rPr lang="en-US" dirty="0"/>
-              <a:t>Visualization simplifies complex data, making it accessible for decision-makers.</a:t>
+              <a:t>It reflects realistic cause-and-effect relationships, showing how policies or external shocks affect sustained participation.</a:t>
             </a:r>
           </a:p>
           <a:p>
@@ -6184,27 +6204,15 @@
             </a:r>
             <a:r>
               <a:rPr lang="en-US" dirty="0"/>
-              <a:t>: A plot showing consistent drops in administrator engagement could prompt targeted measures (e.g., new training or incentives).</a:t>
-            </a:r>
-          </a:p>
-          <a:p>
-            <a:pPr marL="0" indent="0">
-              <a:buNone/>
-            </a:pPr>
-            <a:endParaRPr lang="en-US" dirty="0"/>
-          </a:p>
-          <a:p>
-            <a:pPr marL="0" indent="0">
-              <a:buNone/>
-            </a:pPr>
-            <a:endParaRPr lang="en-US" dirty="0"/>
+              <a:t>: If "Doctors" engagement decreases slightly in Month 2, the new lower level sets the baseline for Month 3, leading to a compounding effect unless counteracted by positive fluctuations.</a:t>
+            </a:r>
           </a:p>
         </p:txBody>
       </p:sp>
     </p:spTree>
     <p:extLst>
       <p:ext uri="{BB962C8B-B14F-4D97-AF65-F5344CB8AC3E}">
-        <p14:creationId xmlns:p14="http://schemas.microsoft.com/office/powerpoint/2010/main" val="3303629775"/>
+        <p14:creationId xmlns:p14="http://schemas.microsoft.com/office/powerpoint/2010/main" val="1348638516"/>
       </p:ext>
     </p:extLst>
   </p:cSld>
@@ -6236,6 +6244,168 @@
           <p:cNvPr id="2" name="Title 1">
             <a:extLst>
               <a:ext uri="{FF2B5EF4-FFF2-40B4-BE49-F238E27FC236}">
+                <a16:creationId xmlns:a16="http://schemas.microsoft.com/office/drawing/2014/main" id="{865F4C6E-9293-6315-8011-08E6FA8D4403}"/>
+              </a:ext>
+            </a:extLst>
+          </p:cNvPr>
+          <p:cNvSpPr>
+            <a:spLocks noGrp="1"/>
+          </p:cNvSpPr>
+          <p:nvPr>
+            <p:ph type="title"/>
+          </p:nvPr>
+        </p:nvSpPr>
+        <p:spPr/>
+        <p:txBody>
+          <a:bodyPr>
+            <a:normAutofit fontScale="90000"/>
+          </a:bodyPr>
+          <a:lstStyle/>
+          <a:p>
+            <a:r>
+              <a:rPr lang="en-US" sz="4400" b="1" dirty="0"/>
+              <a:t>4. Visualizing Trends and Why It Is Important</a:t>
+            </a:r>
+            <a:br>
+              <a:rPr lang="en-US" sz="4400" b="1" dirty="0"/>
+            </a:br>
+            <a:endParaRPr lang="en-US" dirty="0"/>
+          </a:p>
+        </p:txBody>
+      </p:sp>
+      <p:sp>
+        <p:nvSpPr>
+          <p:cNvPr id="3" name="Content Placeholder 2">
+            <a:extLst>
+              <a:ext uri="{FF2B5EF4-FFF2-40B4-BE49-F238E27FC236}">
+                <a16:creationId xmlns:a16="http://schemas.microsoft.com/office/drawing/2014/main" id="{FB0D8D01-EDAF-C0DE-17BF-73983E6CC4D1}"/>
+              </a:ext>
+            </a:extLst>
+          </p:cNvPr>
+          <p:cNvSpPr>
+            <a:spLocks noGrp="1"/>
+          </p:cNvSpPr>
+          <p:nvPr>
+            <p:ph idx="1"/>
+          </p:nvPr>
+        </p:nvSpPr>
+        <p:spPr/>
+        <p:txBody>
+          <a:bodyPr>
+            <a:normAutofit/>
+          </a:bodyPr>
+          <a:lstStyle/>
+          <a:p>
+            <a:pPr>
+              <a:buFont typeface="Arial" panose="020B0604020202020204" pitchFamily="34" charset="0"/>
+              <a:buChar char="•"/>
+            </a:pPr>
+            <a:r>
+              <a:rPr lang="en-US" b="1" dirty="0"/>
+              <a:t>Reason</a:t>
+            </a:r>
+            <a:r>
+              <a:rPr lang="en-US" dirty="0"/>
+              <a:t>: Trends over time help stakeholders understand the overall direction of the system and pinpoint areas for intervention.</a:t>
+            </a:r>
+          </a:p>
+          <a:p>
+            <a:pPr>
+              <a:buFont typeface="Arial" panose="020B0604020202020204" pitchFamily="34" charset="0"/>
+              <a:buChar char="•"/>
+            </a:pPr>
+            <a:r>
+              <a:rPr lang="en-US" b="1" dirty="0"/>
+              <a:t>Purpose in the Simulation</a:t>
+            </a:r>
+            <a:r>
+              <a:rPr lang="en-US" dirty="0"/>
+              <a:t>:</a:t>
+            </a:r>
+          </a:p>
+          <a:p>
+            <a:pPr marL="742950" lvl="1" indent="-285750">
+              <a:buFont typeface="Arial" panose="020B0604020202020204" pitchFamily="34" charset="0"/>
+              <a:buChar char="•"/>
+            </a:pPr>
+            <a:r>
+              <a:rPr lang="en-US" dirty="0"/>
+              <a:t>Identifying whether engagement levels are increasing, stable, or declining over time helps evaluate program success.</a:t>
+            </a:r>
+          </a:p>
+          <a:p>
+            <a:pPr marL="742950" lvl="1" indent="-285750">
+              <a:buFont typeface="Arial" panose="020B0604020202020204" pitchFamily="34" charset="0"/>
+              <a:buChar char="•"/>
+            </a:pPr>
+            <a:r>
+              <a:rPr lang="en-US" dirty="0"/>
+              <a:t>Visualization simplifies complex data, making it accessible for decision-makers.</a:t>
+            </a:r>
+          </a:p>
+          <a:p>
+            <a:pPr>
+              <a:buFont typeface="Arial" panose="020B0604020202020204" pitchFamily="34" charset="0"/>
+              <a:buChar char="•"/>
+            </a:pPr>
+            <a:r>
+              <a:rPr lang="en-US" b="1" dirty="0"/>
+              <a:t>Example</a:t>
+            </a:r>
+            <a:r>
+              <a:rPr lang="en-US" dirty="0"/>
+              <a:t>: A plot showing consistent drops in administrator engagement could prompt targeted measures (e.g., new training or incentives).</a:t>
+            </a:r>
+          </a:p>
+          <a:p>
+            <a:pPr marL="0" indent="0">
+              <a:buNone/>
+            </a:pPr>
+            <a:endParaRPr lang="en-US" dirty="0"/>
+          </a:p>
+          <a:p>
+            <a:pPr marL="0" indent="0">
+              <a:buNone/>
+            </a:pPr>
+            <a:endParaRPr lang="en-US" dirty="0"/>
+          </a:p>
+        </p:txBody>
+      </p:sp>
+    </p:spTree>
+    <p:extLst>
+      <p:ext uri="{BB962C8B-B14F-4D97-AF65-F5344CB8AC3E}">
+        <p14:creationId xmlns:p14="http://schemas.microsoft.com/office/powerpoint/2010/main" val="3303629775"/>
+      </p:ext>
+    </p:extLst>
+  </p:cSld>
+  <p:clrMapOvr>
+    <a:masterClrMapping/>
+  </p:clrMapOvr>
+</p:sld>
+</file>
+
+<file path=ppt/slides/slide28.xml><?xml version="1.0" encoding="utf-8"?>
+<p:sld xmlns:a="http://schemas.openxmlformats.org/drawingml/2006/main" xmlns:r="http://schemas.openxmlformats.org/officeDocument/2006/relationships" xmlns:p="http://schemas.openxmlformats.org/presentationml/2006/main">
+  <p:cSld>
+    <p:spTree>
+      <p:nvGrpSpPr>
+        <p:cNvPr id="1" name=""/>
+        <p:cNvGrpSpPr/>
+        <p:nvPr/>
+      </p:nvGrpSpPr>
+      <p:grpSpPr>
+        <a:xfrm>
+          <a:off x="0" y="0"/>
+          <a:ext cx="0" cy="0"/>
+          <a:chOff x="0" y="0"/>
+          <a:chExt cx="0" cy="0"/>
+        </a:xfrm>
+      </p:grpSpPr>
+      <p:sp>
+        <p:nvSpPr>
+          <p:cNvPr id="2" name="Title 1">
+            <a:extLst>
+              <a:ext uri="{FF2B5EF4-FFF2-40B4-BE49-F238E27FC236}">
                 <a16:creationId xmlns:a16="http://schemas.microsoft.com/office/drawing/2014/main" id="{D88C41F5-CEFA-1C20-A088-02EA6C32A518}"/>
               </a:ext>
             </a:extLst>
@@ -6352,6 +6522,93 @@
     <p:extLst>
       <p:ext uri="{BB962C8B-B14F-4D97-AF65-F5344CB8AC3E}">
         <p14:creationId xmlns:p14="http://schemas.microsoft.com/office/powerpoint/2010/main" val="387507915"/>
+      </p:ext>
+    </p:extLst>
+  </p:cSld>
+  <p:clrMapOvr>
+    <a:masterClrMapping/>
+  </p:clrMapOvr>
+</p:sld>
+</file>
+
+<file path=ppt/slides/slide29.xml><?xml version="1.0" encoding="utf-8"?>
+<p:sld xmlns:a="http://schemas.openxmlformats.org/drawingml/2006/main" xmlns:r="http://schemas.openxmlformats.org/officeDocument/2006/relationships" xmlns:p="http://schemas.openxmlformats.org/presentationml/2006/main">
+  <p:cSld>
+    <p:spTree>
+      <p:nvGrpSpPr>
+        <p:cNvPr id="1" name=""/>
+        <p:cNvGrpSpPr/>
+        <p:nvPr/>
+      </p:nvGrpSpPr>
+      <p:grpSpPr>
+        <a:xfrm>
+          <a:off x="0" y="0"/>
+          <a:ext cx="0" cy="0"/>
+          <a:chOff x="0" y="0"/>
+          <a:chExt cx="0" cy="0"/>
+        </a:xfrm>
+      </p:grpSpPr>
+      <p:sp>
+        <p:nvSpPr>
+          <p:cNvPr id="2" name="Title 1">
+            <a:extLst>
+              <a:ext uri="{FF2B5EF4-FFF2-40B4-BE49-F238E27FC236}">
+                <a16:creationId xmlns:a16="http://schemas.microsoft.com/office/drawing/2014/main" id="{359401A8-8FAA-D579-B630-C01641FAFDBE}"/>
+              </a:ext>
+            </a:extLst>
+          </p:cNvPr>
+          <p:cNvSpPr>
+            <a:spLocks noGrp="1"/>
+          </p:cNvSpPr>
+          <p:nvPr>
+            <p:ph type="title"/>
+          </p:nvPr>
+        </p:nvSpPr>
+        <p:spPr/>
+        <p:txBody>
+          <a:bodyPr/>
+          <a:lstStyle/>
+          <a:p>
+            <a:r>
+              <a:rPr lang="en-US" b="1" dirty="0"/>
+              <a:t>Summary of Key Formulas</a:t>
+            </a:r>
+          </a:p>
+        </p:txBody>
+      </p:sp>
+      <p:pic>
+        <p:nvPicPr>
+          <p:cNvPr id="5" name="Content Placeholder 4">
+            <a:extLst>
+              <a:ext uri="{FF2B5EF4-FFF2-40B4-BE49-F238E27FC236}">
+                <a16:creationId xmlns:a16="http://schemas.microsoft.com/office/drawing/2014/main" id="{C946BF37-028E-99F5-D54D-180CF2C39CA4}"/>
+              </a:ext>
+            </a:extLst>
+          </p:cNvPr>
+          <p:cNvPicPr>
+            <a:picLocks noGrp="1" noChangeAspect="1"/>
+          </p:cNvPicPr>
+          <p:nvPr>
+            <p:ph idx="1"/>
+          </p:nvPr>
+        </p:nvPicPr>
+        <p:blipFill>
+          <a:blip r:embed="rId2"/>
+          <a:stretch>
+            <a:fillRect/>
+          </a:stretch>
+        </p:blipFill>
+        <p:spPr>
+          <a:xfrm>
+            <a:off x="980813" y="1553949"/>
+            <a:ext cx="8275560" cy="4938925"/>
+          </a:xfrm>
+        </p:spPr>
+      </p:pic>
+    </p:spTree>
+    <p:extLst>
+      <p:ext uri="{BB962C8B-B14F-4D97-AF65-F5344CB8AC3E}">
+        <p14:creationId xmlns:p14="http://schemas.microsoft.com/office/powerpoint/2010/main" val="1878192659"/>
       </p:ext>
     </p:extLst>
   </p:cSld>
@@ -6467,6 +6724,1064 @@
 </p:sld>
 </file>
 
+<file path=ppt/slides/slide30.xml><?xml version="1.0" encoding="utf-8"?>
+<p:sld xmlns:a="http://schemas.openxmlformats.org/drawingml/2006/main" xmlns:r="http://schemas.openxmlformats.org/officeDocument/2006/relationships" xmlns:p="http://schemas.openxmlformats.org/presentationml/2006/main">
+  <p:cSld>
+    <p:spTree>
+      <p:nvGrpSpPr>
+        <p:cNvPr id="1" name=""/>
+        <p:cNvGrpSpPr/>
+        <p:nvPr/>
+      </p:nvGrpSpPr>
+      <p:grpSpPr>
+        <a:xfrm>
+          <a:off x="0" y="0"/>
+          <a:ext cx="0" cy="0"/>
+          <a:chOff x="0" y="0"/>
+          <a:chExt cx="0" cy="0"/>
+        </a:xfrm>
+      </p:grpSpPr>
+      <p:sp>
+        <p:nvSpPr>
+          <p:cNvPr id="2" name="Title 1">
+            <a:extLst>
+              <a:ext uri="{FF2B5EF4-FFF2-40B4-BE49-F238E27FC236}">
+                <a16:creationId xmlns:a16="http://schemas.microsoft.com/office/drawing/2014/main" id="{6F870E5F-4C62-6546-7024-9E8A6A969C20}"/>
+              </a:ext>
+            </a:extLst>
+          </p:cNvPr>
+          <p:cNvSpPr>
+            <a:spLocks noGrp="1"/>
+          </p:cNvSpPr>
+          <p:nvPr>
+            <p:ph type="title"/>
+          </p:nvPr>
+        </p:nvSpPr>
+        <p:spPr/>
+        <p:txBody>
+          <a:bodyPr/>
+          <a:lstStyle/>
+          <a:p>
+            <a:r>
+              <a:rPr lang="en-US" b="1" dirty="0"/>
+              <a:t>1. Engagement Simulation Formula</a:t>
+            </a:r>
+          </a:p>
+        </p:txBody>
+      </p:sp>
+      <p:pic>
+        <p:nvPicPr>
+          <p:cNvPr id="11" name="Picture 10">
+            <a:extLst>
+              <a:ext uri="{FF2B5EF4-FFF2-40B4-BE49-F238E27FC236}">
+                <a16:creationId xmlns:a16="http://schemas.microsoft.com/office/drawing/2014/main" id="{376C3BC6-6F1A-966E-E873-D31C2D66D931}"/>
+              </a:ext>
+            </a:extLst>
+          </p:cNvPr>
+          <p:cNvPicPr>
+            <a:picLocks noChangeAspect="1"/>
+          </p:cNvPicPr>
+          <p:nvPr/>
+        </p:nvPicPr>
+        <p:blipFill>
+          <a:blip r:embed="rId2"/>
+          <a:stretch>
+            <a:fillRect/>
+          </a:stretch>
+        </p:blipFill>
+        <p:spPr>
+          <a:xfrm>
+            <a:off x="1066019" y="1838243"/>
+            <a:ext cx="8333741" cy="4654632"/>
+          </a:xfrm>
+          <a:prstGeom prst="rect">
+            <a:avLst/>
+          </a:prstGeom>
+        </p:spPr>
+      </p:pic>
+    </p:spTree>
+    <p:extLst>
+      <p:ext uri="{BB962C8B-B14F-4D97-AF65-F5344CB8AC3E}">
+        <p14:creationId xmlns:p14="http://schemas.microsoft.com/office/powerpoint/2010/main" val="4266184612"/>
+      </p:ext>
+    </p:extLst>
+  </p:cSld>
+  <p:clrMapOvr>
+    <a:masterClrMapping/>
+  </p:clrMapOvr>
+</p:sld>
+</file>
+
+<file path=ppt/slides/slide31.xml><?xml version="1.0" encoding="utf-8"?>
+<p:sld xmlns:a="http://schemas.openxmlformats.org/drawingml/2006/main" xmlns:r="http://schemas.openxmlformats.org/officeDocument/2006/relationships" xmlns:p="http://schemas.openxmlformats.org/presentationml/2006/main">
+  <p:cSld>
+    <p:spTree>
+      <p:nvGrpSpPr>
+        <p:cNvPr id="1" name=""/>
+        <p:cNvGrpSpPr/>
+        <p:nvPr/>
+      </p:nvGrpSpPr>
+      <p:grpSpPr>
+        <a:xfrm>
+          <a:off x="0" y="0"/>
+          <a:ext cx="0" cy="0"/>
+          <a:chOff x="0" y="0"/>
+          <a:chExt cx="0" cy="0"/>
+        </a:xfrm>
+      </p:grpSpPr>
+      <p:sp>
+        <p:nvSpPr>
+          <p:cNvPr id="2" name="Title 1">
+            <a:extLst>
+              <a:ext uri="{FF2B5EF4-FFF2-40B4-BE49-F238E27FC236}">
+                <a16:creationId xmlns:a16="http://schemas.microsoft.com/office/drawing/2014/main" id="{53C61FA5-AADF-2E4B-2C0D-C5F2A04C61ED}"/>
+              </a:ext>
+            </a:extLst>
+          </p:cNvPr>
+          <p:cNvSpPr>
+            <a:spLocks noGrp="1"/>
+          </p:cNvSpPr>
+          <p:nvPr>
+            <p:ph type="title"/>
+          </p:nvPr>
+        </p:nvSpPr>
+        <p:spPr/>
+        <p:txBody>
+          <a:bodyPr/>
+          <a:lstStyle/>
+          <a:p>
+            <a:r>
+              <a:rPr lang="en-US" b="1" dirty="0"/>
+              <a:t>2. Model Uptake Rate Formula</a:t>
+            </a:r>
+          </a:p>
+        </p:txBody>
+      </p:sp>
+      <p:pic>
+        <p:nvPicPr>
+          <p:cNvPr id="5" name="Content Placeholder 4">
+            <a:extLst>
+              <a:ext uri="{FF2B5EF4-FFF2-40B4-BE49-F238E27FC236}">
+                <a16:creationId xmlns:a16="http://schemas.microsoft.com/office/drawing/2014/main" id="{509AB2DF-EC5A-BED8-77AC-321777E65F9C}"/>
+              </a:ext>
+            </a:extLst>
+          </p:cNvPr>
+          <p:cNvPicPr>
+            <a:picLocks noGrp="1" noChangeAspect="1"/>
+          </p:cNvPicPr>
+          <p:nvPr>
+            <p:ph idx="1"/>
+          </p:nvPr>
+        </p:nvPicPr>
+        <p:blipFill>
+          <a:blip r:embed="rId2"/>
+          <a:stretch>
+            <a:fillRect/>
+          </a:stretch>
+        </p:blipFill>
+        <p:spPr>
+          <a:xfrm>
+            <a:off x="1143000" y="1537760"/>
+            <a:ext cx="9547466" cy="4748739"/>
+          </a:xfrm>
+        </p:spPr>
+      </p:pic>
+    </p:spTree>
+    <p:extLst>
+      <p:ext uri="{BB962C8B-B14F-4D97-AF65-F5344CB8AC3E}">
+        <p14:creationId xmlns:p14="http://schemas.microsoft.com/office/powerpoint/2010/main" val="1901633027"/>
+      </p:ext>
+    </p:extLst>
+  </p:cSld>
+  <p:clrMapOvr>
+    <a:masterClrMapping/>
+  </p:clrMapOvr>
+</p:sld>
+</file>
+
+<file path=ppt/slides/slide32.xml><?xml version="1.0" encoding="utf-8"?>
+<p:sld xmlns:a="http://schemas.openxmlformats.org/drawingml/2006/main" xmlns:r="http://schemas.openxmlformats.org/officeDocument/2006/relationships" xmlns:p="http://schemas.openxmlformats.org/presentationml/2006/main">
+  <p:cSld>
+    <p:spTree>
+      <p:nvGrpSpPr>
+        <p:cNvPr id="1" name=""/>
+        <p:cNvGrpSpPr/>
+        <p:nvPr/>
+      </p:nvGrpSpPr>
+      <p:grpSpPr>
+        <a:xfrm>
+          <a:off x="0" y="0"/>
+          <a:ext cx="0" cy="0"/>
+          <a:chOff x="0" y="0"/>
+          <a:chExt cx="0" cy="0"/>
+        </a:xfrm>
+      </p:grpSpPr>
+      <p:sp>
+        <p:nvSpPr>
+          <p:cNvPr id="2" name="Title 1">
+            <a:extLst>
+              <a:ext uri="{FF2B5EF4-FFF2-40B4-BE49-F238E27FC236}">
+                <a16:creationId xmlns:a16="http://schemas.microsoft.com/office/drawing/2014/main" id="{A7693D49-5ADD-03E7-6AD6-1A1C0BC33797}"/>
+              </a:ext>
+            </a:extLst>
+          </p:cNvPr>
+          <p:cNvSpPr>
+            <a:spLocks noGrp="1"/>
+          </p:cNvSpPr>
+          <p:nvPr>
+            <p:ph type="title"/>
+          </p:nvPr>
+        </p:nvSpPr>
+        <p:spPr/>
+        <p:txBody>
+          <a:bodyPr/>
+          <a:lstStyle/>
+          <a:p>
+            <a:r>
+              <a:rPr lang="en-US" b="1" dirty="0"/>
+              <a:t>3. Uptake Rate Feedback Loop</a:t>
+            </a:r>
+          </a:p>
+        </p:txBody>
+      </p:sp>
+      <p:pic>
+        <p:nvPicPr>
+          <p:cNvPr id="5" name="Content Placeholder 4">
+            <a:extLst>
+              <a:ext uri="{FF2B5EF4-FFF2-40B4-BE49-F238E27FC236}">
+                <a16:creationId xmlns:a16="http://schemas.microsoft.com/office/drawing/2014/main" id="{DD07DB38-3883-7214-BE72-E632D473C517}"/>
+              </a:ext>
+            </a:extLst>
+          </p:cNvPr>
+          <p:cNvPicPr>
+            <a:picLocks noGrp="1" noChangeAspect="1"/>
+          </p:cNvPicPr>
+          <p:nvPr>
+            <p:ph idx="1"/>
+          </p:nvPr>
+        </p:nvPicPr>
+        <p:blipFill>
+          <a:blip r:embed="rId2"/>
+          <a:stretch>
+            <a:fillRect/>
+          </a:stretch>
+        </p:blipFill>
+        <p:spPr>
+          <a:xfrm>
+            <a:off x="753495" y="1954634"/>
+            <a:ext cx="9525733" cy="3649211"/>
+          </a:xfrm>
+        </p:spPr>
+      </p:pic>
+    </p:spTree>
+    <p:extLst>
+      <p:ext uri="{BB962C8B-B14F-4D97-AF65-F5344CB8AC3E}">
+        <p14:creationId xmlns:p14="http://schemas.microsoft.com/office/powerpoint/2010/main" val="993494936"/>
+      </p:ext>
+    </p:extLst>
+  </p:cSld>
+  <p:clrMapOvr>
+    <a:masterClrMapping/>
+  </p:clrMapOvr>
+</p:sld>
+</file>
+
+<file path=ppt/slides/slide33.xml><?xml version="1.0" encoding="utf-8"?>
+<p:sld xmlns:a="http://schemas.openxmlformats.org/drawingml/2006/main" xmlns:r="http://schemas.openxmlformats.org/officeDocument/2006/relationships" xmlns:p="http://schemas.openxmlformats.org/presentationml/2006/main">
+  <p:cSld>
+    <p:spTree>
+      <p:nvGrpSpPr>
+        <p:cNvPr id="1" name="">
+          <a:extLst>
+            <a:ext uri="{FF2B5EF4-FFF2-40B4-BE49-F238E27FC236}">
+              <a16:creationId xmlns:a16="http://schemas.microsoft.com/office/drawing/2014/main" id="{DB881C68-0AAE-D805-B32E-417B76559EAE}"/>
+            </a:ext>
+          </a:extLst>
+        </p:cNvPr>
+        <p:cNvGrpSpPr/>
+        <p:nvPr/>
+      </p:nvGrpSpPr>
+      <p:grpSpPr>
+        <a:xfrm>
+          <a:off x="0" y="0"/>
+          <a:ext cx="0" cy="0"/>
+          <a:chOff x="0" y="0"/>
+          <a:chExt cx="0" cy="0"/>
+        </a:xfrm>
+      </p:grpSpPr>
+      <p:sp>
+        <p:nvSpPr>
+          <p:cNvPr id="2" name="Title 1">
+            <a:extLst>
+              <a:ext uri="{FF2B5EF4-FFF2-40B4-BE49-F238E27FC236}">
+                <a16:creationId xmlns:a16="http://schemas.microsoft.com/office/drawing/2014/main" id="{37ACBE16-66B4-2FA5-BBBD-E6CFBEC83D57}"/>
+              </a:ext>
+            </a:extLst>
+          </p:cNvPr>
+          <p:cNvSpPr>
+            <a:spLocks noGrp="1"/>
+          </p:cNvSpPr>
+          <p:nvPr>
+            <p:ph type="title"/>
+          </p:nvPr>
+        </p:nvSpPr>
+        <p:spPr>
+          <a:xfrm>
+            <a:off x="2515998" y="2504317"/>
+            <a:ext cx="10515600" cy="1325563"/>
+          </a:xfrm>
+        </p:spPr>
+        <p:txBody>
+          <a:bodyPr/>
+          <a:lstStyle/>
+          <a:p>
+            <a:r>
+              <a:rPr lang="en-US" b="1" dirty="0"/>
+              <a:t>Numerical Example</a:t>
+            </a:r>
+          </a:p>
+        </p:txBody>
+      </p:sp>
+    </p:spTree>
+    <p:extLst>
+      <p:ext uri="{BB962C8B-B14F-4D97-AF65-F5344CB8AC3E}">
+        <p14:creationId xmlns:p14="http://schemas.microsoft.com/office/powerpoint/2010/main" val="3654834218"/>
+      </p:ext>
+    </p:extLst>
+  </p:cSld>
+  <p:clrMapOvr>
+    <a:masterClrMapping/>
+  </p:clrMapOvr>
+</p:sld>
+</file>
+
+<file path=ppt/slides/slide34.xml><?xml version="1.0" encoding="utf-8"?>
+<p:sld xmlns:a="http://schemas.openxmlformats.org/drawingml/2006/main" xmlns:r="http://schemas.openxmlformats.org/officeDocument/2006/relationships" xmlns:p="http://schemas.openxmlformats.org/presentationml/2006/main">
+  <p:cSld>
+    <p:spTree>
+      <p:nvGrpSpPr>
+        <p:cNvPr id="1" name=""/>
+        <p:cNvGrpSpPr/>
+        <p:nvPr/>
+      </p:nvGrpSpPr>
+      <p:grpSpPr>
+        <a:xfrm>
+          <a:off x="0" y="0"/>
+          <a:ext cx="0" cy="0"/>
+          <a:chOff x="0" y="0"/>
+          <a:chExt cx="0" cy="0"/>
+        </a:xfrm>
+      </p:grpSpPr>
+      <p:sp>
+        <p:nvSpPr>
+          <p:cNvPr id="2" name="Title 1">
+            <a:extLst>
+              <a:ext uri="{FF2B5EF4-FFF2-40B4-BE49-F238E27FC236}">
+                <a16:creationId xmlns:a16="http://schemas.microsoft.com/office/drawing/2014/main" id="{A59CB8A9-2F60-432C-4B99-E9B8A97EE7C3}"/>
+              </a:ext>
+            </a:extLst>
+          </p:cNvPr>
+          <p:cNvSpPr>
+            <a:spLocks noGrp="1"/>
+          </p:cNvSpPr>
+          <p:nvPr>
+            <p:ph type="title"/>
+          </p:nvPr>
+        </p:nvSpPr>
+        <p:spPr/>
+        <p:txBody>
+          <a:bodyPr/>
+          <a:lstStyle/>
+          <a:p>
+            <a:r>
+              <a:rPr lang="en-US" dirty="0"/>
+              <a:t>Numerical example</a:t>
+            </a:r>
+          </a:p>
+        </p:txBody>
+      </p:sp>
+      <p:sp>
+        <p:nvSpPr>
+          <p:cNvPr id="3" name="Content Placeholder 2">
+            <a:extLst>
+              <a:ext uri="{FF2B5EF4-FFF2-40B4-BE49-F238E27FC236}">
+                <a16:creationId xmlns:a16="http://schemas.microsoft.com/office/drawing/2014/main" id="{CD02969A-F93A-0921-A7B4-4AE9831A5E62}"/>
+              </a:ext>
+            </a:extLst>
+          </p:cNvPr>
+          <p:cNvSpPr>
+            <a:spLocks noGrp="1"/>
+          </p:cNvSpPr>
+          <p:nvPr>
+            <p:ph idx="1"/>
+          </p:nvPr>
+        </p:nvSpPr>
+        <p:spPr/>
+        <p:txBody>
+          <a:bodyPr/>
+          <a:lstStyle/>
+          <a:p>
+            <a:pPr marL="0" indent="0" algn="just">
+              <a:buNone/>
+            </a:pPr>
+            <a:r>
+              <a:rPr lang="en-US" dirty="0"/>
+              <a:t>This numerical example illustrates how:</a:t>
+            </a:r>
+          </a:p>
+          <a:p>
+            <a:pPr algn="just">
+              <a:buFont typeface="Arial" panose="020B0604020202020204" pitchFamily="34" charset="0"/>
+              <a:buChar char="•"/>
+            </a:pPr>
+            <a:r>
+              <a:rPr lang="en-US" dirty="0"/>
+              <a:t>Engagement levels fluctuate based on random changes each month.</a:t>
+            </a:r>
+          </a:p>
+          <a:p>
+            <a:pPr algn="just">
+              <a:buFont typeface="Arial" panose="020B0604020202020204" pitchFamily="34" charset="0"/>
+              <a:buChar char="•"/>
+            </a:pPr>
+            <a:r>
+              <a:rPr lang="en-US" dirty="0"/>
+              <a:t>The uptake rate is calculated as the average of the engagement levels.</a:t>
+            </a:r>
+          </a:p>
+          <a:p>
+            <a:pPr algn="just">
+              <a:buFont typeface="Arial" panose="020B0604020202020204" pitchFamily="34" charset="0"/>
+              <a:buChar char="•"/>
+            </a:pPr>
+            <a:r>
+              <a:rPr lang="en-US" dirty="0"/>
+              <a:t>A feedback loop exists, where each month's engagement influences the next, and this pattern can be visualized to see the overall trend.</a:t>
+            </a:r>
+          </a:p>
+          <a:p>
+            <a:pPr algn="just"/>
+            <a:endParaRPr lang="en-US" dirty="0"/>
+          </a:p>
+        </p:txBody>
+      </p:sp>
+    </p:spTree>
+    <p:extLst>
+      <p:ext uri="{BB962C8B-B14F-4D97-AF65-F5344CB8AC3E}">
+        <p14:creationId xmlns:p14="http://schemas.microsoft.com/office/powerpoint/2010/main" val="3065450447"/>
+      </p:ext>
+    </p:extLst>
+  </p:cSld>
+  <p:clrMapOvr>
+    <a:masterClrMapping/>
+  </p:clrMapOvr>
+</p:sld>
+</file>
+
+<file path=ppt/slides/slide35.xml><?xml version="1.0" encoding="utf-8"?>
+<p:sld xmlns:a="http://schemas.openxmlformats.org/drawingml/2006/main" xmlns:r="http://schemas.openxmlformats.org/officeDocument/2006/relationships" xmlns:p="http://schemas.openxmlformats.org/presentationml/2006/main">
+  <p:cSld>
+    <p:spTree>
+      <p:nvGrpSpPr>
+        <p:cNvPr id="1" name=""/>
+        <p:cNvGrpSpPr/>
+        <p:nvPr/>
+      </p:nvGrpSpPr>
+      <p:grpSpPr>
+        <a:xfrm>
+          <a:off x="0" y="0"/>
+          <a:ext cx="0" cy="0"/>
+          <a:chOff x="0" y="0"/>
+          <a:chExt cx="0" cy="0"/>
+        </a:xfrm>
+      </p:grpSpPr>
+      <p:sp>
+        <p:nvSpPr>
+          <p:cNvPr id="2" name="Title 1">
+            <a:extLst>
+              <a:ext uri="{FF2B5EF4-FFF2-40B4-BE49-F238E27FC236}">
+                <a16:creationId xmlns:a16="http://schemas.microsoft.com/office/drawing/2014/main" id="{3582663F-FFB9-2D2E-F74A-2DAA9B29E04B}"/>
+              </a:ext>
+            </a:extLst>
+          </p:cNvPr>
+          <p:cNvSpPr>
+            <a:spLocks noGrp="1"/>
+          </p:cNvSpPr>
+          <p:nvPr>
+            <p:ph type="title"/>
+          </p:nvPr>
+        </p:nvSpPr>
+        <p:spPr/>
+        <p:txBody>
+          <a:bodyPr/>
+          <a:lstStyle/>
+          <a:p>
+            <a:r>
+              <a:rPr lang="en-US" b="1" dirty="0"/>
+              <a:t>Simulation Steps</a:t>
+            </a:r>
+          </a:p>
+        </p:txBody>
+      </p:sp>
+      <p:sp>
+        <p:nvSpPr>
+          <p:cNvPr id="3" name="Content Placeholder 2">
+            <a:extLst>
+              <a:ext uri="{FF2B5EF4-FFF2-40B4-BE49-F238E27FC236}">
+                <a16:creationId xmlns:a16="http://schemas.microsoft.com/office/drawing/2014/main" id="{F3270000-727C-10C0-CC47-006697DC7B58}"/>
+              </a:ext>
+            </a:extLst>
+          </p:cNvPr>
+          <p:cNvSpPr>
+            <a:spLocks noGrp="1"/>
+          </p:cNvSpPr>
+          <p:nvPr>
+            <p:ph idx="1"/>
+          </p:nvPr>
+        </p:nvSpPr>
+        <p:spPr/>
+        <p:txBody>
+          <a:bodyPr/>
+          <a:lstStyle/>
+          <a:p>
+            <a:r>
+              <a:rPr lang="en-US" b="1" dirty="0"/>
+              <a:t>Step 1: Define Initial Engagement Levels</a:t>
+            </a:r>
+          </a:p>
+          <a:p>
+            <a:r>
+              <a:rPr lang="en-US" b="1" dirty="0"/>
+              <a:t>Step 2: Simulate Engagement Fluctuations for 12 Months</a:t>
+            </a:r>
+          </a:p>
+          <a:p>
+            <a:r>
+              <a:rPr lang="en-US" b="1" dirty="0"/>
+              <a:t>Step 3: Calculate Uptake Rate for Month 2</a:t>
+            </a:r>
+          </a:p>
+          <a:p>
+            <a:r>
+              <a:rPr lang="en-US" b="1" dirty="0"/>
+              <a:t>Step 4: Simulate for Month 3</a:t>
+            </a:r>
+          </a:p>
+          <a:p>
+            <a:r>
+              <a:rPr lang="en-US" b="1" dirty="0"/>
+              <a:t>Step 5: Calculate Uptake Rate for Month 3</a:t>
+            </a:r>
+          </a:p>
+          <a:p>
+            <a:r>
+              <a:rPr lang="en-US" b="1" dirty="0"/>
+              <a:t>Step 6: Repeat for Remaining Months</a:t>
+            </a:r>
+          </a:p>
+        </p:txBody>
+      </p:sp>
+    </p:spTree>
+    <p:extLst>
+      <p:ext uri="{BB962C8B-B14F-4D97-AF65-F5344CB8AC3E}">
+        <p14:creationId xmlns:p14="http://schemas.microsoft.com/office/powerpoint/2010/main" val="2465834568"/>
+      </p:ext>
+    </p:extLst>
+  </p:cSld>
+  <p:clrMapOvr>
+    <a:masterClrMapping/>
+  </p:clrMapOvr>
+</p:sld>
+</file>
+
+<file path=ppt/slides/slide36.xml><?xml version="1.0" encoding="utf-8"?>
+<p:sld xmlns:a="http://schemas.openxmlformats.org/drawingml/2006/main" xmlns:r="http://schemas.openxmlformats.org/officeDocument/2006/relationships" xmlns:p="http://schemas.openxmlformats.org/presentationml/2006/main">
+  <p:cSld>
+    <p:spTree>
+      <p:nvGrpSpPr>
+        <p:cNvPr id="1" name=""/>
+        <p:cNvGrpSpPr/>
+        <p:nvPr/>
+      </p:nvGrpSpPr>
+      <p:grpSpPr>
+        <a:xfrm>
+          <a:off x="0" y="0"/>
+          <a:ext cx="0" cy="0"/>
+          <a:chOff x="0" y="0"/>
+          <a:chExt cx="0" cy="0"/>
+        </a:xfrm>
+      </p:grpSpPr>
+      <p:sp>
+        <p:nvSpPr>
+          <p:cNvPr id="2" name="Title 1">
+            <a:extLst>
+              <a:ext uri="{FF2B5EF4-FFF2-40B4-BE49-F238E27FC236}">
+                <a16:creationId xmlns:a16="http://schemas.microsoft.com/office/drawing/2014/main" id="{AF6E53CC-7D1E-6624-763D-4B69072627B4}"/>
+              </a:ext>
+            </a:extLst>
+          </p:cNvPr>
+          <p:cNvSpPr>
+            <a:spLocks noGrp="1"/>
+          </p:cNvSpPr>
+          <p:nvPr>
+            <p:ph type="title"/>
+          </p:nvPr>
+        </p:nvSpPr>
+        <p:spPr/>
+        <p:txBody>
+          <a:bodyPr/>
+          <a:lstStyle/>
+          <a:p>
+            <a:r>
+              <a:rPr lang="en-US" b="1" dirty="0"/>
+              <a:t>Step 1: Define Initial Engagement Levels</a:t>
+            </a:r>
+            <a:endParaRPr lang="en-US" dirty="0"/>
+          </a:p>
+        </p:txBody>
+      </p:sp>
+      <p:sp>
+        <p:nvSpPr>
+          <p:cNvPr id="3" name="Content Placeholder 2">
+            <a:extLst>
+              <a:ext uri="{FF2B5EF4-FFF2-40B4-BE49-F238E27FC236}">
+                <a16:creationId xmlns:a16="http://schemas.microsoft.com/office/drawing/2014/main" id="{1037176A-96AF-A4D6-11A1-8EB588A1F889}"/>
+              </a:ext>
+            </a:extLst>
+          </p:cNvPr>
+          <p:cNvSpPr>
+            <a:spLocks noGrp="1"/>
+          </p:cNvSpPr>
+          <p:nvPr>
+            <p:ph idx="1"/>
+          </p:nvPr>
+        </p:nvSpPr>
+        <p:spPr/>
+        <p:txBody>
+          <a:bodyPr/>
+          <a:lstStyle/>
+          <a:p>
+            <a:r>
+              <a:rPr lang="en-US" dirty="0"/>
+              <a:t>We begin with the following </a:t>
+            </a:r>
+            <a:r>
+              <a:rPr lang="en-US" b="1" dirty="0"/>
+              <a:t>initial engagement levels</a:t>
+            </a:r>
+            <a:r>
+              <a:rPr lang="en-US" dirty="0"/>
+              <a:t> for each stakeholder:</a:t>
+            </a:r>
+          </a:p>
+          <a:p>
+            <a:pPr>
+              <a:buFont typeface="Arial" panose="020B0604020202020204" pitchFamily="34" charset="0"/>
+              <a:buChar char="•"/>
+            </a:pPr>
+            <a:r>
+              <a:rPr lang="en-US" b="1" dirty="0"/>
+              <a:t>Patients</a:t>
+            </a:r>
+            <a:r>
+              <a:rPr lang="en-US" dirty="0"/>
+              <a:t>: 0.6 (60% engaged)</a:t>
+            </a:r>
+          </a:p>
+          <a:p>
+            <a:pPr>
+              <a:buFont typeface="Arial" panose="020B0604020202020204" pitchFamily="34" charset="0"/>
+              <a:buChar char="•"/>
+            </a:pPr>
+            <a:r>
+              <a:rPr lang="en-US" b="1" dirty="0"/>
+              <a:t>Doctors</a:t>
+            </a:r>
+            <a:r>
+              <a:rPr lang="en-US" dirty="0"/>
+              <a:t>: 0.8 (80% engaged)</a:t>
+            </a:r>
+          </a:p>
+          <a:p>
+            <a:pPr>
+              <a:buFont typeface="Arial" panose="020B0604020202020204" pitchFamily="34" charset="0"/>
+              <a:buChar char="•"/>
+            </a:pPr>
+            <a:r>
+              <a:rPr lang="en-US" b="1" dirty="0"/>
+              <a:t>Nurses</a:t>
+            </a:r>
+            <a:r>
+              <a:rPr lang="en-US" dirty="0"/>
+              <a:t>: 0.75 (75% engaged)</a:t>
+            </a:r>
+          </a:p>
+          <a:p>
+            <a:pPr>
+              <a:buFont typeface="Arial" panose="020B0604020202020204" pitchFamily="34" charset="0"/>
+              <a:buChar char="•"/>
+            </a:pPr>
+            <a:r>
+              <a:rPr lang="en-US" b="1" dirty="0"/>
+              <a:t>Administrators</a:t>
+            </a:r>
+            <a:r>
+              <a:rPr lang="en-US" dirty="0"/>
+              <a:t>: 0.5 (50% engaged)</a:t>
+            </a:r>
+          </a:p>
+        </p:txBody>
+      </p:sp>
+    </p:spTree>
+    <p:extLst>
+      <p:ext uri="{BB962C8B-B14F-4D97-AF65-F5344CB8AC3E}">
+        <p14:creationId xmlns:p14="http://schemas.microsoft.com/office/powerpoint/2010/main" val="2183177192"/>
+      </p:ext>
+    </p:extLst>
+  </p:cSld>
+  <p:clrMapOvr>
+    <a:masterClrMapping/>
+  </p:clrMapOvr>
+</p:sld>
+</file>
+
+<file path=ppt/slides/slide37.xml><?xml version="1.0" encoding="utf-8"?>
+<p:sld xmlns:a="http://schemas.openxmlformats.org/drawingml/2006/main" xmlns:r="http://schemas.openxmlformats.org/officeDocument/2006/relationships" xmlns:p="http://schemas.openxmlformats.org/presentationml/2006/main">
+  <p:cSld>
+    <p:spTree>
+      <p:nvGrpSpPr>
+        <p:cNvPr id="1" name=""/>
+        <p:cNvGrpSpPr/>
+        <p:nvPr/>
+      </p:nvGrpSpPr>
+      <p:grpSpPr>
+        <a:xfrm>
+          <a:off x="0" y="0"/>
+          <a:ext cx="0" cy="0"/>
+          <a:chOff x="0" y="0"/>
+          <a:chExt cx="0" cy="0"/>
+        </a:xfrm>
+      </p:grpSpPr>
+      <p:sp>
+        <p:nvSpPr>
+          <p:cNvPr id="2" name="Title 1">
+            <a:extLst>
+              <a:ext uri="{FF2B5EF4-FFF2-40B4-BE49-F238E27FC236}">
+                <a16:creationId xmlns:a16="http://schemas.microsoft.com/office/drawing/2014/main" id="{DAC98F31-2FB9-C77F-0AEA-6E709BE7B660}"/>
+              </a:ext>
+            </a:extLst>
+          </p:cNvPr>
+          <p:cNvSpPr>
+            <a:spLocks noGrp="1"/>
+          </p:cNvSpPr>
+          <p:nvPr>
+            <p:ph type="title"/>
+          </p:nvPr>
+        </p:nvSpPr>
+        <p:spPr/>
+        <p:txBody>
+          <a:bodyPr>
+            <a:normAutofit/>
+          </a:bodyPr>
+          <a:lstStyle/>
+          <a:p>
+            <a:r>
+              <a:rPr lang="en-US" b="1" dirty="0"/>
+              <a:t>Step 2: Simulate Engagement Fluctuations for 12 Months</a:t>
+            </a:r>
+            <a:endParaRPr lang="en-US" dirty="0"/>
+          </a:p>
+        </p:txBody>
+      </p:sp>
+      <p:sp>
+        <p:nvSpPr>
+          <p:cNvPr id="3" name="Content Placeholder 2">
+            <a:extLst>
+              <a:ext uri="{FF2B5EF4-FFF2-40B4-BE49-F238E27FC236}">
+                <a16:creationId xmlns:a16="http://schemas.microsoft.com/office/drawing/2014/main" id="{52CD24E6-869F-2265-E967-EA0C0EDC84AA}"/>
+              </a:ext>
+            </a:extLst>
+          </p:cNvPr>
+          <p:cNvSpPr>
+            <a:spLocks noGrp="1"/>
+          </p:cNvSpPr>
+          <p:nvPr>
+            <p:ph idx="1"/>
+          </p:nvPr>
+        </p:nvSpPr>
+        <p:spPr/>
+        <p:txBody>
+          <a:bodyPr/>
+          <a:lstStyle/>
+          <a:p>
+            <a:pPr marL="0" indent="0">
+              <a:buNone/>
+            </a:pPr>
+            <a:r>
+              <a:rPr lang="en-US" dirty="0"/>
+              <a:t>we apply random fluctuations (within the range [−0.05,+0.05][-0.05, +0.05][−0.05,+0.05]) each month to the initial engagement levels.</a:t>
+            </a:r>
+            <a:endParaRPr lang="en-US" b="1" dirty="0"/>
+          </a:p>
+          <a:p>
+            <a:r>
+              <a:rPr lang="en-US" b="1" dirty="0"/>
+              <a:t>Month 1:</a:t>
+            </a:r>
+          </a:p>
+          <a:p>
+            <a:pPr>
+              <a:buFont typeface="Arial" panose="020B0604020202020204" pitchFamily="34" charset="0"/>
+              <a:buChar char="•"/>
+            </a:pPr>
+            <a:r>
+              <a:rPr lang="en-US" b="1" dirty="0"/>
+              <a:t>Initial Engagement</a:t>
+            </a:r>
+            <a:r>
+              <a:rPr lang="en-US" dirty="0"/>
+              <a:t> (for all stakeholders):</a:t>
+            </a:r>
+          </a:p>
+          <a:p>
+            <a:pPr marL="742950" lvl="1" indent="-285750">
+              <a:buFont typeface="Arial" panose="020B0604020202020204" pitchFamily="34" charset="0"/>
+              <a:buChar char="•"/>
+            </a:pPr>
+            <a:r>
+              <a:rPr lang="en-US" b="1" dirty="0"/>
+              <a:t>Patients</a:t>
+            </a:r>
+            <a:r>
+              <a:rPr lang="en-US" dirty="0"/>
+              <a:t>: 0.6</a:t>
+            </a:r>
+          </a:p>
+          <a:p>
+            <a:pPr marL="742950" lvl="1" indent="-285750">
+              <a:buFont typeface="Arial" panose="020B0604020202020204" pitchFamily="34" charset="0"/>
+              <a:buChar char="•"/>
+            </a:pPr>
+            <a:r>
+              <a:rPr lang="en-US" b="1" dirty="0"/>
+              <a:t>Doctors</a:t>
+            </a:r>
+            <a:r>
+              <a:rPr lang="en-US" dirty="0"/>
+              <a:t>: 0.8</a:t>
+            </a:r>
+          </a:p>
+          <a:p>
+            <a:pPr marL="742950" lvl="1" indent="-285750">
+              <a:buFont typeface="Arial" panose="020B0604020202020204" pitchFamily="34" charset="0"/>
+              <a:buChar char="•"/>
+            </a:pPr>
+            <a:r>
+              <a:rPr lang="en-US" b="1" dirty="0"/>
+              <a:t>Nurses</a:t>
+            </a:r>
+            <a:r>
+              <a:rPr lang="en-US" dirty="0"/>
+              <a:t>: 0.75</a:t>
+            </a:r>
+          </a:p>
+          <a:p>
+            <a:pPr marL="742950" lvl="1" indent="-285750">
+              <a:buFont typeface="Arial" panose="020B0604020202020204" pitchFamily="34" charset="0"/>
+              <a:buChar char="•"/>
+            </a:pPr>
+            <a:r>
+              <a:rPr lang="en-US" b="1" dirty="0"/>
+              <a:t>Administrators</a:t>
+            </a:r>
+            <a:r>
+              <a:rPr lang="en-US" dirty="0"/>
+              <a:t>: 0.5</a:t>
+            </a:r>
+          </a:p>
+          <a:p>
+            <a:pPr marL="0" indent="0">
+              <a:buNone/>
+            </a:pPr>
+            <a:endParaRPr lang="en-US" dirty="0"/>
+          </a:p>
+        </p:txBody>
+      </p:sp>
+    </p:spTree>
+    <p:extLst>
+      <p:ext uri="{BB962C8B-B14F-4D97-AF65-F5344CB8AC3E}">
+        <p14:creationId xmlns:p14="http://schemas.microsoft.com/office/powerpoint/2010/main" val="3867802229"/>
+      </p:ext>
+    </p:extLst>
+  </p:cSld>
+  <p:clrMapOvr>
+    <a:masterClrMapping/>
+  </p:clrMapOvr>
+</p:sld>
+</file>
+
+<file path=ppt/slides/slide38.xml><?xml version="1.0" encoding="utf-8"?>
+<p:sld xmlns:a="http://schemas.openxmlformats.org/drawingml/2006/main" xmlns:r="http://schemas.openxmlformats.org/officeDocument/2006/relationships" xmlns:p="http://schemas.openxmlformats.org/presentationml/2006/main">
+  <p:cSld>
+    <p:spTree>
+      <p:nvGrpSpPr>
+        <p:cNvPr id="1" name=""/>
+        <p:cNvGrpSpPr/>
+        <p:nvPr/>
+      </p:nvGrpSpPr>
+      <p:grpSpPr>
+        <a:xfrm>
+          <a:off x="0" y="0"/>
+          <a:ext cx="0" cy="0"/>
+          <a:chOff x="0" y="0"/>
+          <a:chExt cx="0" cy="0"/>
+        </a:xfrm>
+      </p:grpSpPr>
+      <p:sp>
+        <p:nvSpPr>
+          <p:cNvPr id="2" name="Title 1">
+            <a:extLst>
+              <a:ext uri="{FF2B5EF4-FFF2-40B4-BE49-F238E27FC236}">
+                <a16:creationId xmlns:a16="http://schemas.microsoft.com/office/drawing/2014/main" id="{A3BFB231-84DE-64BC-93C6-48E5983BC312}"/>
+              </a:ext>
+            </a:extLst>
+          </p:cNvPr>
+          <p:cNvSpPr>
+            <a:spLocks noGrp="1"/>
+          </p:cNvSpPr>
+          <p:nvPr>
+            <p:ph type="title"/>
+          </p:nvPr>
+        </p:nvSpPr>
+        <p:spPr/>
+        <p:txBody>
+          <a:bodyPr/>
+          <a:lstStyle/>
+          <a:p>
+            <a:r>
+              <a:rPr lang="en-US" b="1" dirty="0"/>
+              <a:t>Month 2 (First Fluctuation)</a:t>
+            </a:r>
+            <a:endParaRPr lang="en-US" dirty="0"/>
+          </a:p>
+        </p:txBody>
+      </p:sp>
+      <p:sp>
+        <p:nvSpPr>
+          <p:cNvPr id="3" name="Content Placeholder 2">
+            <a:extLst>
+              <a:ext uri="{FF2B5EF4-FFF2-40B4-BE49-F238E27FC236}">
+                <a16:creationId xmlns:a16="http://schemas.microsoft.com/office/drawing/2014/main" id="{F137F21A-78F7-CECA-4708-8B565C64DA77}"/>
+              </a:ext>
+            </a:extLst>
+          </p:cNvPr>
+          <p:cNvSpPr>
+            <a:spLocks noGrp="1"/>
+          </p:cNvSpPr>
+          <p:nvPr>
+            <p:ph idx="1"/>
+          </p:nvPr>
+        </p:nvSpPr>
+        <p:spPr/>
+        <p:txBody>
+          <a:bodyPr/>
+          <a:lstStyle/>
+          <a:p>
+            <a:pPr marL="0" indent="0">
+              <a:buNone/>
+            </a:pPr>
+            <a:r>
+              <a:rPr lang="en-US" dirty="0"/>
+              <a:t>Assume the random fluctuations for each stakeholder are as follows:</a:t>
+            </a:r>
+          </a:p>
+          <a:p>
+            <a:pPr marL="0" indent="0">
+              <a:buNone/>
+            </a:pPr>
+            <a:endParaRPr lang="en-US" dirty="0"/>
+          </a:p>
+          <a:p>
+            <a:pPr marL="0" indent="0">
+              <a:buNone/>
+            </a:pPr>
+            <a:endParaRPr lang="en-US" dirty="0"/>
+          </a:p>
+        </p:txBody>
+      </p:sp>
+    </p:spTree>
+    <p:extLst>
+      <p:ext uri="{BB962C8B-B14F-4D97-AF65-F5344CB8AC3E}">
+        <p14:creationId xmlns:p14="http://schemas.microsoft.com/office/powerpoint/2010/main" val="267507049"/>
+      </p:ext>
+    </p:extLst>
+  </p:cSld>
+  <p:clrMapOvr>
+    <a:masterClrMapping/>
+  </p:clrMapOvr>
+</p:sld>
+</file>
+
+<file path=ppt/slides/slide39.xml><?xml version="1.0" encoding="utf-8"?>
+<p:sld xmlns:a="http://schemas.openxmlformats.org/drawingml/2006/main" xmlns:r="http://schemas.openxmlformats.org/officeDocument/2006/relationships" xmlns:p="http://schemas.openxmlformats.org/presentationml/2006/main">
+  <p:cSld>
+    <p:spTree>
+      <p:nvGrpSpPr>
+        <p:cNvPr id="1" name=""/>
+        <p:cNvGrpSpPr/>
+        <p:nvPr/>
+      </p:nvGrpSpPr>
+      <p:grpSpPr>
+        <a:xfrm>
+          <a:off x="0" y="0"/>
+          <a:ext cx="0" cy="0"/>
+          <a:chOff x="0" y="0"/>
+          <a:chExt cx="0" cy="0"/>
+        </a:xfrm>
+      </p:grpSpPr>
+      <p:pic>
+        <p:nvPicPr>
+          <p:cNvPr id="5" name="Picture 4">
+            <a:extLst>
+              <a:ext uri="{FF2B5EF4-FFF2-40B4-BE49-F238E27FC236}">
+                <a16:creationId xmlns:a16="http://schemas.microsoft.com/office/drawing/2014/main" id="{09E34BB4-9B57-7EB9-A0D4-F883E3EA7D7A}"/>
+              </a:ext>
+            </a:extLst>
+          </p:cNvPr>
+          <p:cNvPicPr>
+            <a:picLocks noChangeAspect="1"/>
+          </p:cNvPicPr>
+          <p:nvPr/>
+        </p:nvPicPr>
+        <p:blipFill>
+          <a:blip r:embed="rId2"/>
+          <a:stretch>
+            <a:fillRect/>
+          </a:stretch>
+        </p:blipFill>
+        <p:spPr>
+          <a:xfrm>
+            <a:off x="2323961" y="421958"/>
+            <a:ext cx="6088949" cy="6247290"/>
+          </a:xfrm>
+          <a:prstGeom prst="rect">
+            <a:avLst/>
+          </a:prstGeom>
+        </p:spPr>
+      </p:pic>
+    </p:spTree>
+    <p:extLst>
+      <p:ext uri="{BB962C8B-B14F-4D97-AF65-F5344CB8AC3E}">
+        <p14:creationId xmlns:p14="http://schemas.microsoft.com/office/powerpoint/2010/main" val="1379721022"/>
+      </p:ext>
+    </p:extLst>
+  </p:cSld>
+  <p:clrMapOvr>
+    <a:masterClrMapping/>
+  </p:clrMapOvr>
+</p:sld>
+</file>
+
 <file path=ppt/slides/slide4.xml><?xml version="1.0" encoding="utf-8"?>
 <p:sld xmlns:a="http://schemas.openxmlformats.org/drawingml/2006/main" xmlns:r="http://schemas.openxmlformats.org/officeDocument/2006/relationships" xmlns:p="http://schemas.openxmlformats.org/presentationml/2006/main">
   <p:cSld>
@@ -6543,7 +7858,15 @@
             <a:pPr algn="just"/>
             <a:r>
               <a:rPr lang="en-US" dirty="0"/>
-              <a:t>My experience at USI, ETH Zürich and the Free University of Bozen-Bolzano (UNIBZ) involved hands-on projects focused on participatory modeling, software reliability, and system dynamics—areas I believe are highly relevant to this position.</a:t>
+              <a:t>My experience at USI, ETH Zürich and the Free University of Bozen-Bolzano (UNIBZ) involved hands-on projects and laboratory focused on participatory Modulation Simulation Optimization, Human Machine Interaction, software reliability and testing,</a:t>
+            </a:r>
+            <a:r>
+              <a:rPr lang="ar-SA" dirty="0"/>
+              <a:t> </a:t>
+            </a:r>
+            <a:r>
+              <a:rPr lang="en-US" dirty="0"/>
+              <a:t>Stochastic process and system dynamics—areas I believe are highly relevant to this position.</a:t>
             </a:r>
           </a:p>
         </p:txBody>
@@ -6552,6 +7875,918 @@
     <p:extLst>
       <p:ext uri="{BB962C8B-B14F-4D97-AF65-F5344CB8AC3E}">
         <p14:creationId xmlns:p14="http://schemas.microsoft.com/office/powerpoint/2010/main" val="3200188890"/>
+      </p:ext>
+    </p:extLst>
+  </p:cSld>
+  <p:clrMapOvr>
+    <a:masterClrMapping/>
+  </p:clrMapOvr>
+</p:sld>
+</file>
+
+<file path=ppt/slides/slide40.xml><?xml version="1.0" encoding="utf-8"?>
+<p:sld xmlns:a="http://schemas.openxmlformats.org/drawingml/2006/main" xmlns:r="http://schemas.openxmlformats.org/officeDocument/2006/relationships" xmlns:p="http://schemas.openxmlformats.org/presentationml/2006/main">
+  <p:cSld>
+    <p:spTree>
+      <p:nvGrpSpPr>
+        <p:cNvPr id="1" name=""/>
+        <p:cNvGrpSpPr/>
+        <p:nvPr/>
+      </p:nvGrpSpPr>
+      <p:grpSpPr>
+        <a:xfrm>
+          <a:off x="0" y="0"/>
+          <a:ext cx="0" cy="0"/>
+          <a:chOff x="0" y="0"/>
+          <a:chExt cx="0" cy="0"/>
+        </a:xfrm>
+      </p:grpSpPr>
+      <p:sp>
+        <p:nvSpPr>
+          <p:cNvPr id="2" name="Title 1">
+            <a:extLst>
+              <a:ext uri="{FF2B5EF4-FFF2-40B4-BE49-F238E27FC236}">
+                <a16:creationId xmlns:a16="http://schemas.microsoft.com/office/drawing/2014/main" id="{A245C48B-F092-0BCA-5962-2833A4C05B4D}"/>
+              </a:ext>
+            </a:extLst>
+          </p:cNvPr>
+          <p:cNvSpPr>
+            <a:spLocks noGrp="1"/>
+          </p:cNvSpPr>
+          <p:nvPr>
+            <p:ph type="title"/>
+          </p:nvPr>
+        </p:nvSpPr>
+        <p:spPr/>
+        <p:txBody>
+          <a:bodyPr/>
+          <a:lstStyle/>
+          <a:p>
+            <a:r>
+              <a:rPr lang="en-US" b="1" dirty="0"/>
+              <a:t>Month 2 Engagement Levels</a:t>
+            </a:r>
+            <a:endParaRPr lang="en-US" dirty="0"/>
+          </a:p>
+        </p:txBody>
+      </p:sp>
+      <p:sp>
+        <p:nvSpPr>
+          <p:cNvPr id="3" name="Content Placeholder 2">
+            <a:extLst>
+              <a:ext uri="{FF2B5EF4-FFF2-40B4-BE49-F238E27FC236}">
+                <a16:creationId xmlns:a16="http://schemas.microsoft.com/office/drawing/2014/main" id="{0A42358D-C626-A6A7-162C-B4D3757B119F}"/>
+              </a:ext>
+            </a:extLst>
+          </p:cNvPr>
+          <p:cNvSpPr>
+            <a:spLocks noGrp="1"/>
+          </p:cNvSpPr>
+          <p:nvPr>
+            <p:ph idx="1"/>
+          </p:nvPr>
+        </p:nvSpPr>
+        <p:spPr/>
+        <p:txBody>
+          <a:bodyPr/>
+          <a:lstStyle/>
+          <a:p>
+            <a:pPr>
+              <a:buFont typeface="Arial" panose="020B0604020202020204" pitchFamily="34" charset="0"/>
+              <a:buChar char="•"/>
+            </a:pPr>
+            <a:r>
+              <a:rPr lang="en-US" b="1" dirty="0"/>
+              <a:t>Patients</a:t>
+            </a:r>
+            <a:r>
+              <a:rPr lang="en-US" dirty="0"/>
+              <a:t>: 0.63</a:t>
+            </a:r>
+          </a:p>
+          <a:p>
+            <a:pPr>
+              <a:buFont typeface="Arial" panose="020B0604020202020204" pitchFamily="34" charset="0"/>
+              <a:buChar char="•"/>
+            </a:pPr>
+            <a:r>
+              <a:rPr lang="en-US" b="1" dirty="0"/>
+              <a:t>Doctors</a:t>
+            </a:r>
+            <a:r>
+              <a:rPr lang="en-US" dirty="0"/>
+              <a:t>: 0.78</a:t>
+            </a:r>
+          </a:p>
+          <a:p>
+            <a:pPr>
+              <a:buFont typeface="Arial" panose="020B0604020202020204" pitchFamily="34" charset="0"/>
+              <a:buChar char="•"/>
+            </a:pPr>
+            <a:r>
+              <a:rPr lang="en-US" b="1" dirty="0"/>
+              <a:t>Nurses</a:t>
+            </a:r>
+            <a:r>
+              <a:rPr lang="en-US" dirty="0"/>
+              <a:t>: 0.76</a:t>
+            </a:r>
+          </a:p>
+          <a:p>
+            <a:pPr>
+              <a:buFont typeface="Arial" panose="020B0604020202020204" pitchFamily="34" charset="0"/>
+              <a:buChar char="•"/>
+            </a:pPr>
+            <a:r>
+              <a:rPr lang="en-US" b="1" dirty="0"/>
+              <a:t>Administrators</a:t>
+            </a:r>
+            <a:r>
+              <a:rPr lang="en-US" dirty="0"/>
+              <a:t>: 0.54</a:t>
+            </a:r>
+          </a:p>
+          <a:p>
+            <a:pPr marL="0" indent="0">
+              <a:buNone/>
+            </a:pPr>
+            <a:endParaRPr lang="en-US" dirty="0"/>
+          </a:p>
+        </p:txBody>
+      </p:sp>
+    </p:spTree>
+    <p:extLst>
+      <p:ext uri="{BB962C8B-B14F-4D97-AF65-F5344CB8AC3E}">
+        <p14:creationId xmlns:p14="http://schemas.microsoft.com/office/powerpoint/2010/main" val="2392780534"/>
+      </p:ext>
+    </p:extLst>
+  </p:cSld>
+  <p:clrMapOvr>
+    <a:masterClrMapping/>
+  </p:clrMapOvr>
+</p:sld>
+</file>
+
+<file path=ppt/slides/slide41.xml><?xml version="1.0" encoding="utf-8"?>
+<p:sld xmlns:a="http://schemas.openxmlformats.org/drawingml/2006/main" xmlns:r="http://schemas.openxmlformats.org/officeDocument/2006/relationships" xmlns:p="http://schemas.openxmlformats.org/presentationml/2006/main">
+  <p:cSld>
+    <p:spTree>
+      <p:nvGrpSpPr>
+        <p:cNvPr id="1" name=""/>
+        <p:cNvGrpSpPr/>
+        <p:nvPr/>
+      </p:nvGrpSpPr>
+      <p:grpSpPr>
+        <a:xfrm>
+          <a:off x="0" y="0"/>
+          <a:ext cx="0" cy="0"/>
+          <a:chOff x="0" y="0"/>
+          <a:chExt cx="0" cy="0"/>
+        </a:xfrm>
+      </p:grpSpPr>
+      <p:sp>
+        <p:nvSpPr>
+          <p:cNvPr id="2" name="Title 1">
+            <a:extLst>
+              <a:ext uri="{FF2B5EF4-FFF2-40B4-BE49-F238E27FC236}">
+                <a16:creationId xmlns:a16="http://schemas.microsoft.com/office/drawing/2014/main" id="{BB06A895-59F9-A587-B902-83634EDB394B}"/>
+              </a:ext>
+            </a:extLst>
+          </p:cNvPr>
+          <p:cNvSpPr>
+            <a:spLocks noGrp="1"/>
+          </p:cNvSpPr>
+          <p:nvPr>
+            <p:ph type="title"/>
+          </p:nvPr>
+        </p:nvSpPr>
+        <p:spPr/>
+        <p:txBody>
+          <a:bodyPr/>
+          <a:lstStyle/>
+          <a:p>
+            <a:r>
+              <a:rPr lang="en-US" b="1" dirty="0"/>
+              <a:t>Step 3: Calculate Uptake Rate for Month 2</a:t>
+            </a:r>
+            <a:endParaRPr lang="en-US" dirty="0"/>
+          </a:p>
+        </p:txBody>
+      </p:sp>
+      <p:pic>
+        <p:nvPicPr>
+          <p:cNvPr id="5" name="Content Placeholder 4">
+            <a:extLst>
+              <a:ext uri="{FF2B5EF4-FFF2-40B4-BE49-F238E27FC236}">
+                <a16:creationId xmlns:a16="http://schemas.microsoft.com/office/drawing/2014/main" id="{0B320E85-3F39-04EA-8D03-9CB72B5C0832}"/>
+              </a:ext>
+            </a:extLst>
+          </p:cNvPr>
+          <p:cNvPicPr>
+            <a:picLocks noGrp="1" noChangeAspect="1"/>
+          </p:cNvPicPr>
+          <p:nvPr>
+            <p:ph idx="1"/>
+          </p:nvPr>
+        </p:nvPicPr>
+        <p:blipFill>
+          <a:blip r:embed="rId2"/>
+          <a:stretch>
+            <a:fillRect/>
+          </a:stretch>
+        </p:blipFill>
+        <p:spPr>
+          <a:xfrm>
+            <a:off x="529872" y="1828800"/>
+            <a:ext cx="11069618" cy="4320540"/>
+          </a:xfrm>
+        </p:spPr>
+      </p:pic>
+    </p:spTree>
+    <p:extLst>
+      <p:ext uri="{BB962C8B-B14F-4D97-AF65-F5344CB8AC3E}">
+        <p14:creationId xmlns:p14="http://schemas.microsoft.com/office/powerpoint/2010/main" val="1304821326"/>
+      </p:ext>
+    </p:extLst>
+  </p:cSld>
+  <p:clrMapOvr>
+    <a:masterClrMapping/>
+  </p:clrMapOvr>
+</p:sld>
+</file>
+
+<file path=ppt/slides/slide42.xml><?xml version="1.0" encoding="utf-8"?>
+<p:sld xmlns:a="http://schemas.openxmlformats.org/drawingml/2006/main" xmlns:r="http://schemas.openxmlformats.org/officeDocument/2006/relationships" xmlns:p="http://schemas.openxmlformats.org/presentationml/2006/main">
+  <p:cSld>
+    <p:spTree>
+      <p:nvGrpSpPr>
+        <p:cNvPr id="1" name=""/>
+        <p:cNvGrpSpPr/>
+        <p:nvPr/>
+      </p:nvGrpSpPr>
+      <p:grpSpPr>
+        <a:xfrm>
+          <a:off x="0" y="0"/>
+          <a:ext cx="0" cy="0"/>
+          <a:chOff x="0" y="0"/>
+          <a:chExt cx="0" cy="0"/>
+        </a:xfrm>
+      </p:grpSpPr>
+      <p:sp>
+        <p:nvSpPr>
+          <p:cNvPr id="2" name="Title 1">
+            <a:extLst>
+              <a:ext uri="{FF2B5EF4-FFF2-40B4-BE49-F238E27FC236}">
+                <a16:creationId xmlns:a16="http://schemas.microsoft.com/office/drawing/2014/main" id="{AA261731-11D6-5826-92C2-A188C8138BAE}"/>
+              </a:ext>
+            </a:extLst>
+          </p:cNvPr>
+          <p:cNvSpPr>
+            <a:spLocks noGrp="1"/>
+          </p:cNvSpPr>
+          <p:nvPr>
+            <p:ph type="title"/>
+          </p:nvPr>
+        </p:nvSpPr>
+        <p:spPr/>
+        <p:txBody>
+          <a:bodyPr/>
+          <a:lstStyle/>
+          <a:p>
+            <a:r>
+              <a:rPr lang="en-US" b="1" dirty="0"/>
+              <a:t>Step 4: Simulate for Month 3</a:t>
+            </a:r>
+            <a:endParaRPr lang="en-US" dirty="0"/>
+          </a:p>
+        </p:txBody>
+      </p:sp>
+      <p:pic>
+        <p:nvPicPr>
+          <p:cNvPr id="5" name="Content Placeholder 4">
+            <a:extLst>
+              <a:ext uri="{FF2B5EF4-FFF2-40B4-BE49-F238E27FC236}">
+                <a16:creationId xmlns:a16="http://schemas.microsoft.com/office/drawing/2014/main" id="{E40A475A-6D76-6A08-1386-8BD67BDD8A58}"/>
+              </a:ext>
+            </a:extLst>
+          </p:cNvPr>
+          <p:cNvPicPr>
+            <a:picLocks noGrp="1" noChangeAspect="1"/>
+          </p:cNvPicPr>
+          <p:nvPr>
+            <p:ph idx="1"/>
+          </p:nvPr>
+        </p:nvPicPr>
+        <p:blipFill>
+          <a:blip r:embed="rId2"/>
+          <a:stretch>
+            <a:fillRect/>
+          </a:stretch>
+        </p:blipFill>
+        <p:spPr>
+          <a:xfrm>
+            <a:off x="664903" y="1840230"/>
+            <a:ext cx="9364481" cy="3726180"/>
+          </a:xfrm>
+        </p:spPr>
+      </p:pic>
+    </p:spTree>
+    <p:extLst>
+      <p:ext uri="{BB962C8B-B14F-4D97-AF65-F5344CB8AC3E}">
+        <p14:creationId xmlns:p14="http://schemas.microsoft.com/office/powerpoint/2010/main" val="93422283"/>
+      </p:ext>
+    </p:extLst>
+  </p:cSld>
+  <p:clrMapOvr>
+    <a:masterClrMapping/>
+  </p:clrMapOvr>
+</p:sld>
+</file>
+
+<file path=ppt/slides/slide43.xml><?xml version="1.0" encoding="utf-8"?>
+<p:sld xmlns:a="http://schemas.openxmlformats.org/drawingml/2006/main" xmlns:r="http://schemas.openxmlformats.org/officeDocument/2006/relationships" xmlns:p="http://schemas.openxmlformats.org/presentationml/2006/main">
+  <p:cSld>
+    <p:spTree>
+      <p:nvGrpSpPr>
+        <p:cNvPr id="1" name=""/>
+        <p:cNvGrpSpPr/>
+        <p:nvPr/>
+      </p:nvGrpSpPr>
+      <p:grpSpPr>
+        <a:xfrm>
+          <a:off x="0" y="0"/>
+          <a:ext cx="0" cy="0"/>
+          <a:chOff x="0" y="0"/>
+          <a:chExt cx="0" cy="0"/>
+        </a:xfrm>
+      </p:grpSpPr>
+      <p:pic>
+        <p:nvPicPr>
+          <p:cNvPr id="5" name="Picture 4">
+            <a:extLst>
+              <a:ext uri="{FF2B5EF4-FFF2-40B4-BE49-F238E27FC236}">
+                <a16:creationId xmlns:a16="http://schemas.microsoft.com/office/drawing/2014/main" id="{2B0B354D-C44C-2CE0-99E0-DCC31EAA5EC2}"/>
+              </a:ext>
+            </a:extLst>
+          </p:cNvPr>
+          <p:cNvPicPr>
+            <a:picLocks noChangeAspect="1"/>
+          </p:cNvPicPr>
+          <p:nvPr/>
+        </p:nvPicPr>
+        <p:blipFill>
+          <a:blip r:embed="rId2"/>
+          <a:stretch>
+            <a:fillRect/>
+          </a:stretch>
+        </p:blipFill>
+        <p:spPr>
+          <a:xfrm>
+            <a:off x="1417321" y="328461"/>
+            <a:ext cx="7486786" cy="6201077"/>
+          </a:xfrm>
+          <a:prstGeom prst="rect">
+            <a:avLst/>
+          </a:prstGeom>
+        </p:spPr>
+      </p:pic>
+    </p:spTree>
+    <p:extLst>
+      <p:ext uri="{BB962C8B-B14F-4D97-AF65-F5344CB8AC3E}">
+        <p14:creationId xmlns:p14="http://schemas.microsoft.com/office/powerpoint/2010/main" val="1641835664"/>
+      </p:ext>
+    </p:extLst>
+  </p:cSld>
+  <p:clrMapOvr>
+    <a:masterClrMapping/>
+  </p:clrMapOvr>
+</p:sld>
+</file>
+
+<file path=ppt/slides/slide44.xml><?xml version="1.0" encoding="utf-8"?>
+<p:sld xmlns:a="http://schemas.openxmlformats.org/drawingml/2006/main" xmlns:r="http://schemas.openxmlformats.org/officeDocument/2006/relationships" xmlns:p="http://schemas.openxmlformats.org/presentationml/2006/main">
+  <p:cSld>
+    <p:spTree>
+      <p:nvGrpSpPr>
+        <p:cNvPr id="1" name=""/>
+        <p:cNvGrpSpPr/>
+        <p:nvPr/>
+      </p:nvGrpSpPr>
+      <p:grpSpPr>
+        <a:xfrm>
+          <a:off x="0" y="0"/>
+          <a:ext cx="0" cy="0"/>
+          <a:chOff x="0" y="0"/>
+          <a:chExt cx="0" cy="0"/>
+        </a:xfrm>
+      </p:grpSpPr>
+      <p:sp>
+        <p:nvSpPr>
+          <p:cNvPr id="2" name="Title 1">
+            <a:extLst>
+              <a:ext uri="{FF2B5EF4-FFF2-40B4-BE49-F238E27FC236}">
+                <a16:creationId xmlns:a16="http://schemas.microsoft.com/office/drawing/2014/main" id="{555DAF58-A0B8-E4D0-23F4-A3224D298D69}"/>
+              </a:ext>
+            </a:extLst>
+          </p:cNvPr>
+          <p:cNvSpPr>
+            <a:spLocks noGrp="1"/>
+          </p:cNvSpPr>
+          <p:nvPr>
+            <p:ph type="title"/>
+          </p:nvPr>
+        </p:nvSpPr>
+        <p:spPr/>
+        <p:txBody>
+          <a:bodyPr/>
+          <a:lstStyle/>
+          <a:p>
+            <a:r>
+              <a:rPr lang="en-US" b="1" dirty="0"/>
+              <a:t>Month 3 Engagement Levels</a:t>
+            </a:r>
+            <a:endParaRPr lang="en-US" dirty="0"/>
+          </a:p>
+        </p:txBody>
+      </p:sp>
+      <p:sp>
+        <p:nvSpPr>
+          <p:cNvPr id="3" name="Content Placeholder 2">
+            <a:extLst>
+              <a:ext uri="{FF2B5EF4-FFF2-40B4-BE49-F238E27FC236}">
+                <a16:creationId xmlns:a16="http://schemas.microsoft.com/office/drawing/2014/main" id="{B69A44F4-2AF7-5F60-66EB-5BE793BFA733}"/>
+              </a:ext>
+            </a:extLst>
+          </p:cNvPr>
+          <p:cNvSpPr>
+            <a:spLocks noGrp="1"/>
+          </p:cNvSpPr>
+          <p:nvPr>
+            <p:ph idx="1"/>
+          </p:nvPr>
+        </p:nvSpPr>
+        <p:spPr/>
+        <p:txBody>
+          <a:bodyPr/>
+          <a:lstStyle/>
+          <a:p>
+            <a:pPr>
+              <a:buFont typeface="Arial" panose="020B0604020202020204" pitchFamily="34" charset="0"/>
+              <a:buChar char="•"/>
+            </a:pPr>
+            <a:r>
+              <a:rPr lang="en-US" b="1" dirty="0"/>
+              <a:t>Patients</a:t>
+            </a:r>
+            <a:r>
+              <a:rPr lang="en-US" dirty="0"/>
+              <a:t>: 0.61</a:t>
+            </a:r>
+          </a:p>
+          <a:p>
+            <a:pPr>
+              <a:buFont typeface="Arial" panose="020B0604020202020204" pitchFamily="34" charset="0"/>
+              <a:buChar char="•"/>
+            </a:pPr>
+            <a:r>
+              <a:rPr lang="en-US" b="1" dirty="0"/>
+              <a:t>Doctors</a:t>
+            </a:r>
+            <a:r>
+              <a:rPr lang="en-US" dirty="0"/>
+              <a:t>: 0.79</a:t>
+            </a:r>
+          </a:p>
+          <a:p>
+            <a:pPr>
+              <a:buFont typeface="Arial" panose="020B0604020202020204" pitchFamily="34" charset="0"/>
+              <a:buChar char="•"/>
+            </a:pPr>
+            <a:r>
+              <a:rPr lang="en-US" b="1" dirty="0"/>
+              <a:t>Nurses</a:t>
+            </a:r>
+            <a:r>
+              <a:rPr lang="en-US" dirty="0"/>
+              <a:t>: 0.73</a:t>
+            </a:r>
+          </a:p>
+          <a:p>
+            <a:pPr>
+              <a:buFont typeface="Arial" panose="020B0604020202020204" pitchFamily="34" charset="0"/>
+              <a:buChar char="•"/>
+            </a:pPr>
+            <a:r>
+              <a:rPr lang="en-US" b="1" dirty="0"/>
+              <a:t>Administrators</a:t>
+            </a:r>
+            <a:r>
+              <a:rPr lang="en-US" dirty="0"/>
+              <a:t>: 0.53</a:t>
+            </a:r>
+          </a:p>
+          <a:p>
+            <a:pPr marL="0" indent="0">
+              <a:buNone/>
+            </a:pPr>
+            <a:endParaRPr lang="en-US" dirty="0"/>
+          </a:p>
+        </p:txBody>
+      </p:sp>
+    </p:spTree>
+    <p:extLst>
+      <p:ext uri="{BB962C8B-B14F-4D97-AF65-F5344CB8AC3E}">
+        <p14:creationId xmlns:p14="http://schemas.microsoft.com/office/powerpoint/2010/main" val="3431756054"/>
+      </p:ext>
+    </p:extLst>
+  </p:cSld>
+  <p:clrMapOvr>
+    <a:masterClrMapping/>
+  </p:clrMapOvr>
+</p:sld>
+</file>
+
+<file path=ppt/slides/slide45.xml><?xml version="1.0" encoding="utf-8"?>
+<p:sld xmlns:a="http://schemas.openxmlformats.org/drawingml/2006/main" xmlns:r="http://schemas.openxmlformats.org/officeDocument/2006/relationships" xmlns:p="http://schemas.openxmlformats.org/presentationml/2006/main">
+  <p:cSld>
+    <p:spTree>
+      <p:nvGrpSpPr>
+        <p:cNvPr id="1" name=""/>
+        <p:cNvGrpSpPr/>
+        <p:nvPr/>
+      </p:nvGrpSpPr>
+      <p:grpSpPr>
+        <a:xfrm>
+          <a:off x="0" y="0"/>
+          <a:ext cx="0" cy="0"/>
+          <a:chOff x="0" y="0"/>
+          <a:chExt cx="0" cy="0"/>
+        </a:xfrm>
+      </p:grpSpPr>
+      <p:sp>
+        <p:nvSpPr>
+          <p:cNvPr id="2" name="Title 1">
+            <a:extLst>
+              <a:ext uri="{FF2B5EF4-FFF2-40B4-BE49-F238E27FC236}">
+                <a16:creationId xmlns:a16="http://schemas.microsoft.com/office/drawing/2014/main" id="{418EF76A-A44C-64C3-5D49-4714CE3E72CC}"/>
+              </a:ext>
+            </a:extLst>
+          </p:cNvPr>
+          <p:cNvSpPr>
+            <a:spLocks noGrp="1"/>
+          </p:cNvSpPr>
+          <p:nvPr>
+            <p:ph type="title"/>
+          </p:nvPr>
+        </p:nvSpPr>
+        <p:spPr/>
+        <p:txBody>
+          <a:bodyPr/>
+          <a:lstStyle/>
+          <a:p>
+            <a:r>
+              <a:rPr lang="en-US" b="1" dirty="0"/>
+              <a:t>Step 5: Calculate Uptake Rate for Month 3</a:t>
+            </a:r>
+            <a:endParaRPr lang="en-US" dirty="0"/>
+          </a:p>
+        </p:txBody>
+      </p:sp>
+      <p:pic>
+        <p:nvPicPr>
+          <p:cNvPr id="5" name="Content Placeholder 4">
+            <a:extLst>
+              <a:ext uri="{FF2B5EF4-FFF2-40B4-BE49-F238E27FC236}">
+                <a16:creationId xmlns:a16="http://schemas.microsoft.com/office/drawing/2014/main" id="{D4E23DC5-E849-6D3B-CA53-8F924D9AD5AB}"/>
+              </a:ext>
+            </a:extLst>
+          </p:cNvPr>
+          <p:cNvPicPr>
+            <a:picLocks noGrp="1" noChangeAspect="1"/>
+          </p:cNvPicPr>
+          <p:nvPr>
+            <p:ph idx="1"/>
+          </p:nvPr>
+        </p:nvPicPr>
+        <p:blipFill>
+          <a:blip r:embed="rId2"/>
+          <a:stretch>
+            <a:fillRect/>
+          </a:stretch>
+        </p:blipFill>
+        <p:spPr>
+          <a:xfrm>
+            <a:off x="1241994" y="2484027"/>
+            <a:ext cx="10646938" cy="2247993"/>
+          </a:xfrm>
+        </p:spPr>
+      </p:pic>
+    </p:spTree>
+    <p:extLst>
+      <p:ext uri="{BB962C8B-B14F-4D97-AF65-F5344CB8AC3E}">
+        <p14:creationId xmlns:p14="http://schemas.microsoft.com/office/powerpoint/2010/main" val="1132329806"/>
+      </p:ext>
+    </p:extLst>
+  </p:cSld>
+  <p:clrMapOvr>
+    <a:masterClrMapping/>
+  </p:clrMapOvr>
+</p:sld>
+</file>
+
+<file path=ppt/slides/slide46.xml><?xml version="1.0" encoding="utf-8"?>
+<p:sld xmlns:a="http://schemas.openxmlformats.org/drawingml/2006/main" xmlns:r="http://schemas.openxmlformats.org/officeDocument/2006/relationships" xmlns:p="http://schemas.openxmlformats.org/presentationml/2006/main">
+  <p:cSld>
+    <p:spTree>
+      <p:nvGrpSpPr>
+        <p:cNvPr id="1" name=""/>
+        <p:cNvGrpSpPr/>
+        <p:nvPr/>
+      </p:nvGrpSpPr>
+      <p:grpSpPr>
+        <a:xfrm>
+          <a:off x="0" y="0"/>
+          <a:ext cx="0" cy="0"/>
+          <a:chOff x="0" y="0"/>
+          <a:chExt cx="0" cy="0"/>
+        </a:xfrm>
+      </p:grpSpPr>
+      <p:sp>
+        <p:nvSpPr>
+          <p:cNvPr id="2" name="Title 1">
+            <a:extLst>
+              <a:ext uri="{FF2B5EF4-FFF2-40B4-BE49-F238E27FC236}">
+                <a16:creationId xmlns:a16="http://schemas.microsoft.com/office/drawing/2014/main" id="{9C03D75A-5C4B-3E23-3D97-7D055F746A08}"/>
+              </a:ext>
+            </a:extLst>
+          </p:cNvPr>
+          <p:cNvSpPr>
+            <a:spLocks noGrp="1"/>
+          </p:cNvSpPr>
+          <p:nvPr>
+            <p:ph type="title"/>
+          </p:nvPr>
+        </p:nvSpPr>
+        <p:spPr/>
+        <p:txBody>
+          <a:bodyPr/>
+          <a:lstStyle/>
+          <a:p>
+            <a:r>
+              <a:rPr lang="en-US" dirty="0"/>
+              <a:t>Summary of the First 3 Months</a:t>
+            </a:r>
+          </a:p>
+        </p:txBody>
+      </p:sp>
+      <p:pic>
+        <p:nvPicPr>
+          <p:cNvPr id="5" name="Picture 4">
+            <a:extLst>
+              <a:ext uri="{FF2B5EF4-FFF2-40B4-BE49-F238E27FC236}">
+                <a16:creationId xmlns:a16="http://schemas.microsoft.com/office/drawing/2014/main" id="{F2F93567-E1E1-D383-A91A-6A565CF0A037}"/>
+              </a:ext>
+            </a:extLst>
+          </p:cNvPr>
+          <p:cNvPicPr>
+            <a:picLocks noChangeAspect="1"/>
+          </p:cNvPicPr>
+          <p:nvPr/>
+        </p:nvPicPr>
+        <p:blipFill>
+          <a:blip r:embed="rId2"/>
+          <a:stretch>
+            <a:fillRect/>
+          </a:stretch>
+        </p:blipFill>
+        <p:spPr>
+          <a:xfrm>
+            <a:off x="289560" y="2023110"/>
+            <a:ext cx="11415361" cy="2240280"/>
+          </a:xfrm>
+          <a:prstGeom prst="rect">
+            <a:avLst/>
+          </a:prstGeom>
+        </p:spPr>
+      </p:pic>
+    </p:spTree>
+    <p:extLst>
+      <p:ext uri="{BB962C8B-B14F-4D97-AF65-F5344CB8AC3E}">
+        <p14:creationId xmlns:p14="http://schemas.microsoft.com/office/powerpoint/2010/main" val="3269075715"/>
+      </p:ext>
+    </p:extLst>
+  </p:cSld>
+  <p:clrMapOvr>
+    <a:masterClrMapping/>
+  </p:clrMapOvr>
+</p:sld>
+</file>
+
+<file path=ppt/slides/slide47.xml><?xml version="1.0" encoding="utf-8"?>
+<p:sld xmlns:a="http://schemas.openxmlformats.org/drawingml/2006/main" xmlns:r="http://schemas.openxmlformats.org/officeDocument/2006/relationships" xmlns:p="http://schemas.openxmlformats.org/presentationml/2006/main">
+  <p:cSld>
+    <p:spTree>
+      <p:nvGrpSpPr>
+        <p:cNvPr id="1" name=""/>
+        <p:cNvGrpSpPr/>
+        <p:nvPr/>
+      </p:nvGrpSpPr>
+      <p:grpSpPr>
+        <a:xfrm>
+          <a:off x="0" y="0"/>
+          <a:ext cx="0" cy="0"/>
+          <a:chOff x="0" y="0"/>
+          <a:chExt cx="0" cy="0"/>
+        </a:xfrm>
+      </p:grpSpPr>
+      <p:sp>
+        <p:nvSpPr>
+          <p:cNvPr id="2" name="Title 1">
+            <a:extLst>
+              <a:ext uri="{FF2B5EF4-FFF2-40B4-BE49-F238E27FC236}">
+                <a16:creationId xmlns:a16="http://schemas.microsoft.com/office/drawing/2014/main" id="{F35657FB-568A-F557-7FE9-BA2F835099DC}"/>
+              </a:ext>
+            </a:extLst>
+          </p:cNvPr>
+          <p:cNvSpPr>
+            <a:spLocks noGrp="1"/>
+          </p:cNvSpPr>
+          <p:nvPr>
+            <p:ph type="title"/>
+          </p:nvPr>
+        </p:nvSpPr>
+        <p:spPr/>
+        <p:txBody>
+          <a:bodyPr/>
+          <a:lstStyle/>
+          <a:p>
+            <a:r>
+              <a:rPr lang="en-US" b="1" dirty="0"/>
+              <a:t>Step 6: Repeat for Remaining Months</a:t>
+            </a:r>
+            <a:endParaRPr lang="en-US" dirty="0"/>
+          </a:p>
+        </p:txBody>
+      </p:sp>
+      <p:sp>
+        <p:nvSpPr>
+          <p:cNvPr id="3" name="Content Placeholder 2">
+            <a:extLst>
+              <a:ext uri="{FF2B5EF4-FFF2-40B4-BE49-F238E27FC236}">
+                <a16:creationId xmlns:a16="http://schemas.microsoft.com/office/drawing/2014/main" id="{688F6E8F-8A36-073E-AB40-E42B293B4F3F}"/>
+              </a:ext>
+            </a:extLst>
+          </p:cNvPr>
+          <p:cNvSpPr>
+            <a:spLocks noGrp="1"/>
+          </p:cNvSpPr>
+          <p:nvPr>
+            <p:ph idx="1"/>
+          </p:nvPr>
+        </p:nvSpPr>
+        <p:spPr/>
+        <p:txBody>
+          <a:bodyPr/>
+          <a:lstStyle/>
+          <a:p>
+            <a:pPr algn="just"/>
+            <a:r>
+              <a:rPr lang="en-US" dirty="0"/>
+              <a:t>The same process is repeated for the remaining months (Month 4 to Month 12), where new fluctuations are applied each month to simulate the evolution of engagement levels and the corresponding uptake rate. </a:t>
+            </a:r>
+          </a:p>
+          <a:p>
+            <a:pPr algn="just"/>
+            <a:r>
+              <a:rPr lang="en-US" dirty="0"/>
+              <a:t>The final uptakes are plotted over time to visualize the model’s performance.</a:t>
+            </a:r>
+          </a:p>
+        </p:txBody>
+      </p:sp>
+    </p:spTree>
+    <p:extLst>
+      <p:ext uri="{BB962C8B-B14F-4D97-AF65-F5344CB8AC3E}">
+        <p14:creationId xmlns:p14="http://schemas.microsoft.com/office/powerpoint/2010/main" val="564831343"/>
+      </p:ext>
+    </p:extLst>
+  </p:cSld>
+  <p:clrMapOvr>
+    <a:masterClrMapping/>
+  </p:clrMapOvr>
+</p:sld>
+</file>
+
+<file path=ppt/slides/slide48.xml><?xml version="1.0" encoding="utf-8"?>
+<p:sld xmlns:a="http://schemas.openxmlformats.org/drawingml/2006/main" xmlns:r="http://schemas.openxmlformats.org/officeDocument/2006/relationships" xmlns:p="http://schemas.openxmlformats.org/presentationml/2006/main">
+  <p:cSld>
+    <p:spTree>
+      <p:nvGrpSpPr>
+        <p:cNvPr id="1" name=""/>
+        <p:cNvGrpSpPr/>
+        <p:nvPr/>
+      </p:nvGrpSpPr>
+      <p:grpSpPr>
+        <a:xfrm>
+          <a:off x="0" y="0"/>
+          <a:ext cx="0" cy="0"/>
+          <a:chOff x="0" y="0"/>
+          <a:chExt cx="0" cy="0"/>
+        </a:xfrm>
+      </p:grpSpPr>
+      <p:pic>
+        <p:nvPicPr>
+          <p:cNvPr id="5" name="Picture 4">
+            <a:extLst>
+              <a:ext uri="{FF2B5EF4-FFF2-40B4-BE49-F238E27FC236}">
+                <a16:creationId xmlns:a16="http://schemas.microsoft.com/office/drawing/2014/main" id="{02613AB4-A91C-2007-99C7-A45CA896978B}"/>
+              </a:ext>
+            </a:extLst>
+          </p:cNvPr>
+          <p:cNvPicPr>
+            <a:picLocks noChangeAspect="1"/>
+          </p:cNvPicPr>
+          <p:nvPr/>
+        </p:nvPicPr>
+        <p:blipFill>
+          <a:blip r:embed="rId2"/>
+          <a:srcRect l="1261" t="1843"/>
+          <a:stretch/>
+        </p:blipFill>
+        <p:spPr>
+          <a:xfrm>
+            <a:off x="388620" y="297625"/>
+            <a:ext cx="10218420" cy="6560375"/>
+          </a:xfrm>
+          <a:prstGeom prst="rect">
+            <a:avLst/>
+          </a:prstGeom>
+        </p:spPr>
+      </p:pic>
+    </p:spTree>
+    <p:extLst>
+      <p:ext uri="{BB962C8B-B14F-4D97-AF65-F5344CB8AC3E}">
+        <p14:creationId xmlns:p14="http://schemas.microsoft.com/office/powerpoint/2010/main" val="352014599"/>
+      </p:ext>
+    </p:extLst>
+  </p:cSld>
+  <p:clrMapOvr>
+    <a:masterClrMapping/>
+  </p:clrMapOvr>
+</p:sld>
+</file>
+
+<file path=ppt/slides/slide49.xml><?xml version="1.0" encoding="utf-8"?>
+<p:sld xmlns:a="http://schemas.openxmlformats.org/drawingml/2006/main" xmlns:r="http://schemas.openxmlformats.org/officeDocument/2006/relationships" xmlns:p="http://schemas.openxmlformats.org/presentationml/2006/main">
+  <p:cSld>
+    <p:spTree>
+      <p:nvGrpSpPr>
+        <p:cNvPr id="1" name=""/>
+        <p:cNvGrpSpPr/>
+        <p:nvPr/>
+      </p:nvGrpSpPr>
+      <p:grpSpPr>
+        <a:xfrm>
+          <a:off x="0" y="0"/>
+          <a:ext cx="0" cy="0"/>
+          <a:chOff x="0" y="0"/>
+          <a:chExt cx="0" cy="0"/>
+        </a:xfrm>
+      </p:grpSpPr>
+      <p:pic>
+        <p:nvPicPr>
+          <p:cNvPr id="5" name="Picture 4">
+            <a:extLst>
+              <a:ext uri="{FF2B5EF4-FFF2-40B4-BE49-F238E27FC236}">
+                <a16:creationId xmlns:a16="http://schemas.microsoft.com/office/drawing/2014/main" id="{35601A60-922E-5507-7374-B66DB34F0C00}"/>
+              </a:ext>
+            </a:extLst>
+          </p:cNvPr>
+          <p:cNvPicPr>
+            <a:picLocks noChangeAspect="1"/>
+          </p:cNvPicPr>
+          <p:nvPr/>
+        </p:nvPicPr>
+        <p:blipFill>
+          <a:blip r:embed="rId2"/>
+          <a:stretch>
+            <a:fillRect/>
+          </a:stretch>
+        </p:blipFill>
+        <p:spPr>
+          <a:xfrm>
+            <a:off x="712101" y="162367"/>
+            <a:ext cx="10432149" cy="6533265"/>
+          </a:xfrm>
+          <a:prstGeom prst="rect">
+            <a:avLst/>
+          </a:prstGeom>
+        </p:spPr>
+      </p:pic>
+    </p:spTree>
+    <p:extLst>
+      <p:ext uri="{BB962C8B-B14F-4D97-AF65-F5344CB8AC3E}">
+        <p14:creationId xmlns:p14="http://schemas.microsoft.com/office/powerpoint/2010/main" val="981455110"/>
       </p:ext>
     </p:extLst>
   </p:cSld>
@@ -6648,6 +8883,112 @@
     <p:extLst>
       <p:ext uri="{BB962C8B-B14F-4D97-AF65-F5344CB8AC3E}">
         <p14:creationId xmlns:p14="http://schemas.microsoft.com/office/powerpoint/2010/main" val="757653921"/>
+      </p:ext>
+    </p:extLst>
+  </p:cSld>
+  <p:clrMapOvr>
+    <a:masterClrMapping/>
+  </p:clrMapOvr>
+</p:sld>
+</file>
+
+<file path=ppt/slides/slide50.xml><?xml version="1.0" encoding="utf-8"?>
+<p:sld xmlns:a="http://schemas.openxmlformats.org/drawingml/2006/main" xmlns:r="http://schemas.openxmlformats.org/officeDocument/2006/relationships" xmlns:p="http://schemas.openxmlformats.org/presentationml/2006/main">
+  <p:cSld>
+    <p:spTree>
+      <p:nvGrpSpPr>
+        <p:cNvPr id="1" name=""/>
+        <p:cNvGrpSpPr/>
+        <p:nvPr/>
+      </p:nvGrpSpPr>
+      <p:grpSpPr>
+        <a:xfrm>
+          <a:off x="0" y="0"/>
+          <a:ext cx="0" cy="0"/>
+          <a:chOff x="0" y="0"/>
+          <a:chExt cx="0" cy="0"/>
+        </a:xfrm>
+      </p:grpSpPr>
+      <p:sp>
+        <p:nvSpPr>
+          <p:cNvPr id="2" name="Title 1">
+            <a:extLst>
+              <a:ext uri="{FF2B5EF4-FFF2-40B4-BE49-F238E27FC236}">
+                <a16:creationId xmlns:a16="http://schemas.microsoft.com/office/drawing/2014/main" id="{0EE09850-8D58-DD45-2EC1-3E6CDCF67FF7}"/>
+              </a:ext>
+            </a:extLst>
+          </p:cNvPr>
+          <p:cNvSpPr>
+            <a:spLocks noGrp="1"/>
+          </p:cNvSpPr>
+          <p:nvPr>
+            <p:ph type="title"/>
+          </p:nvPr>
+        </p:nvSpPr>
+        <p:spPr/>
+        <p:txBody>
+          <a:bodyPr/>
+          <a:lstStyle/>
+          <a:p>
+            <a:r>
+              <a:rPr lang="en-US"/>
+              <a:t>Under Development …</a:t>
+            </a:r>
+            <a:endParaRPr lang="en-US" dirty="0"/>
+          </a:p>
+        </p:txBody>
+      </p:sp>
+      <p:pic>
+        <p:nvPicPr>
+          <p:cNvPr id="2050" name="Picture 2">
+            <a:extLst>
+              <a:ext uri="{FF2B5EF4-FFF2-40B4-BE49-F238E27FC236}">
+                <a16:creationId xmlns:a16="http://schemas.microsoft.com/office/drawing/2014/main" id="{A15830AC-0DE2-65D7-E3E0-665D77B99431}"/>
+              </a:ext>
+            </a:extLst>
+          </p:cNvPr>
+          <p:cNvPicPr>
+            <a:picLocks noChangeAspect="1" noChangeArrowheads="1"/>
+          </p:cNvPicPr>
+          <p:nvPr/>
+        </p:nvPicPr>
+        <p:blipFill>
+          <a:blip r:embed="rId2">
+            <a:extLst>
+              <a:ext uri="{28A0092B-C50C-407E-A947-70E740481C1C}">
+                <a14:useLocalDpi xmlns:a14="http://schemas.microsoft.com/office/drawing/2010/main" val="0"/>
+              </a:ext>
+            </a:extLst>
+          </a:blip>
+          <a:srcRect/>
+          <a:stretch>
+            <a:fillRect/>
+          </a:stretch>
+        </p:blipFill>
+        <p:spPr bwMode="auto">
+          <a:xfrm>
+            <a:off x="583511" y="1508760"/>
+            <a:ext cx="11024977" cy="5132070"/>
+          </a:xfrm>
+          <a:prstGeom prst="rect">
+            <a:avLst/>
+          </a:prstGeom>
+          <a:noFill/>
+          <a:extLst>
+            <a:ext uri="{909E8E84-426E-40DD-AFC4-6F175D3DCCD1}">
+              <a14:hiddenFill xmlns:a14="http://schemas.microsoft.com/office/drawing/2010/main">
+                <a:solidFill>
+                  <a:srgbClr val="FFFFFF"/>
+                </a:solidFill>
+              </a14:hiddenFill>
+            </a:ext>
+          </a:extLst>
+        </p:spPr>
+      </p:pic>
+    </p:spTree>
+    <p:extLst>
+      <p:ext uri="{BB962C8B-B14F-4D97-AF65-F5344CB8AC3E}">
+        <p14:creationId xmlns:p14="http://schemas.microsoft.com/office/powerpoint/2010/main" val="4291504715"/>
       </p:ext>
     </p:extLst>
   </p:cSld>

</xml_diff>